<commit_message>
updating files for multiple dispatch
</commit_message>
<xml_diff>
--- a/ClassMaterials/ProjectWorkday1/Slides/DesignInheritance.pptx
+++ b/ClassMaterials/ProjectWorkday1/Slides/DesignInheritance.pptx
@@ -5,31 +5,33 @@
     <p:sldMasterId id="2147484629" r:id="rId1"/>
   </p:sldMasterIdLst>
   <p:notesMasterIdLst>
-    <p:notesMasterId r:id="rId21"/>
+    <p:notesMasterId r:id="rId23"/>
   </p:notesMasterIdLst>
   <p:handoutMasterIdLst>
-    <p:handoutMasterId r:id="rId22"/>
+    <p:handoutMasterId r:id="rId24"/>
   </p:handoutMasterIdLst>
   <p:sldIdLst>
     <p:sldId id="311" r:id="rId2"/>
     <p:sldId id="313" r:id="rId3"/>
-    <p:sldId id="316" r:id="rId4"/>
-    <p:sldId id="310" r:id="rId5"/>
-    <p:sldId id="314" r:id="rId6"/>
-    <p:sldId id="315" r:id="rId7"/>
-    <p:sldId id="317" r:id="rId8"/>
-    <p:sldId id="318" r:id="rId9"/>
-    <p:sldId id="320" r:id="rId10"/>
-    <p:sldId id="321" r:id="rId11"/>
-    <p:sldId id="319" r:id="rId12"/>
-    <p:sldId id="322" r:id="rId13"/>
-    <p:sldId id="323" r:id="rId14"/>
-    <p:sldId id="325" r:id="rId15"/>
-    <p:sldId id="328" r:id="rId16"/>
-    <p:sldId id="329" r:id="rId17"/>
-    <p:sldId id="312" r:id="rId18"/>
-    <p:sldId id="326" r:id="rId19"/>
-    <p:sldId id="327" r:id="rId20"/>
+    <p:sldId id="331" r:id="rId4"/>
+    <p:sldId id="316" r:id="rId5"/>
+    <p:sldId id="310" r:id="rId6"/>
+    <p:sldId id="314" r:id="rId7"/>
+    <p:sldId id="315" r:id="rId8"/>
+    <p:sldId id="317" r:id="rId9"/>
+    <p:sldId id="318" r:id="rId10"/>
+    <p:sldId id="320" r:id="rId11"/>
+    <p:sldId id="321" r:id="rId12"/>
+    <p:sldId id="319" r:id="rId13"/>
+    <p:sldId id="322" r:id="rId14"/>
+    <p:sldId id="323" r:id="rId15"/>
+    <p:sldId id="325" r:id="rId16"/>
+    <p:sldId id="328" r:id="rId17"/>
+    <p:sldId id="329" r:id="rId18"/>
+    <p:sldId id="312" r:id="rId19"/>
+    <p:sldId id="326" r:id="rId20"/>
+    <p:sldId id="327" r:id="rId21"/>
+    <p:sldId id="330" r:id="rId22"/>
   </p:sldIdLst>
   <p:sldSz cx="9144000" cy="6858000" type="screen4x3"/>
   <p:notesSz cx="6881813" cy="9296400"/>
@@ -291,7 +293,7 @@
             <a:fld id="{68AFFCC9-E980-4A2E-8F84-91052C1F2C22}" type="datetime1">
               <a:rPr lang="en-US"/>
               <a:pPr/>
-              <a:t>5/7/2018</a:t>
+              <a:t>5/9/2020</a:t>
             </a:fld>
             <a:endParaRPr lang="en-US"/>
           </a:p>
@@ -520,7 +522,7 @@
             <a:fld id="{C4411CED-79EF-4046-B79B-F8927B54B6B0}" type="datetime1">
               <a:rPr lang="en-US"/>
               <a:pPr/>
-              <a:t>5/7/2018</a:t>
+              <a:t>5/9/2020</a:t>
             </a:fld>
             <a:endParaRPr lang="en-US"/>
           </a:p>
@@ -1040,7 +1042,7 @@
             <a:fld id="{36B4252A-5ADE-4726-AF7E-E9EADC640C88}" type="slidenum">
               <a:rPr lang="en-US" smtClean="0"/>
               <a:pPr/>
-              <a:t>4</a:t>
+              <a:t>5</a:t>
             </a:fld>
             <a:endParaRPr lang="en-US"/>
           </a:p>
@@ -1135,7 +1137,7 @@
             <a:fld id="{36B4252A-5ADE-4726-AF7E-E9EADC640C88}" type="slidenum">
               <a:rPr lang="en-US" smtClean="0"/>
               <a:pPr/>
-              <a:t>5</a:t>
+              <a:t>6</a:t>
             </a:fld>
             <a:endParaRPr lang="en-US"/>
           </a:p>
@@ -1228,7 +1230,7 @@
             <a:fld id="{36B4252A-5ADE-4726-AF7E-E9EADC640C88}" type="slidenum">
               <a:rPr lang="en-US" smtClean="0"/>
               <a:pPr/>
-              <a:t>6</a:t>
+              <a:t>7</a:t>
             </a:fld>
             <a:endParaRPr lang="en-US"/>
           </a:p>
@@ -1329,7 +1331,7 @@
             <a:fld id="{36B4252A-5ADE-4726-AF7E-E9EADC640C88}" type="slidenum">
               <a:rPr lang="en-US" smtClean="0"/>
               <a:pPr/>
-              <a:t>11</a:t>
+              <a:t>12</a:t>
             </a:fld>
             <a:endParaRPr lang="en-US"/>
           </a:p>
@@ -1424,7 +1426,7 @@
             <a:fld id="{36B4252A-5ADE-4726-AF7E-E9EADC640C88}" type="slidenum">
               <a:rPr lang="en-US" smtClean="0"/>
               <a:pPr/>
-              <a:t>14</a:t>
+              <a:t>15</a:t>
             </a:fld>
             <a:endParaRPr lang="en-US"/>
           </a:p>
@@ -1524,7 +1526,7 @@
             <a:fld id="{4EE02099-3122-448C-8379-2F83E5A8613A}" type="slidenum">
               <a:rPr lang="en-US"/>
               <a:pPr/>
-              <a:t>17</a:t>
+              <a:t>18</a:t>
             </a:fld>
             <a:endParaRPr lang="en-US"/>
           </a:p>
@@ -1617,7 +1619,7 @@
             <a:fld id="{36B4252A-5ADE-4726-AF7E-E9EADC640C88}" type="slidenum">
               <a:rPr lang="en-US" smtClean="0"/>
               <a:pPr/>
-              <a:t>18</a:t>
+              <a:t>19</a:t>
             </a:fld>
             <a:endParaRPr lang="en-US"/>
           </a:p>
@@ -1818,7 +1820,7 @@
             <a:fld id="{43E6E5DC-7A70-4CAB-B8CA-FD7CFBA6DDCF}" type="datetime1">
               <a:rPr lang="en-US" smtClean="0"/>
               <a:pPr/>
-              <a:t>5/7/2018</a:t>
+              <a:t>5/9/2020</a:t>
             </a:fld>
             <a:endParaRPr lang="en-US"/>
           </a:p>
@@ -1993,7 +1995,7 @@
             <a:fld id="{34C58A64-F6CF-4D4F-A14E-4E9A6689521C}" type="datetime1">
               <a:rPr lang="en-US" smtClean="0"/>
               <a:pPr/>
-              <a:t>5/7/2018</a:t>
+              <a:t>5/9/2020</a:t>
             </a:fld>
             <a:endParaRPr lang="en-US"/>
           </a:p>
@@ -2178,7 +2180,7 @@
             <a:fld id="{28A961FD-7946-4EF3-8B09-2E96C5099CE1}" type="datetime1">
               <a:rPr lang="en-US" smtClean="0"/>
               <a:pPr/>
-              <a:t>5/7/2018</a:t>
+              <a:t>5/9/2020</a:t>
             </a:fld>
             <a:endParaRPr lang="en-US"/>
           </a:p>
@@ -2353,7 +2355,7 @@
             <a:fld id="{410E03A8-3A50-4824-93B1-5AB2817A85E6}" type="datetime1">
               <a:rPr lang="en-US" smtClean="0"/>
               <a:pPr/>
-              <a:t>5/7/2018</a:t>
+              <a:t>5/9/2020</a:t>
             </a:fld>
             <a:endParaRPr lang="en-US"/>
           </a:p>
@@ -2604,7 +2606,7 @@
             <a:fld id="{69EE78C3-2E3E-4EDD-A8FC-A11FEA9CDF04}" type="datetime1">
               <a:rPr lang="en-US" smtClean="0"/>
               <a:pPr/>
-              <a:t>5/7/2018</a:t>
+              <a:t>5/9/2020</a:t>
             </a:fld>
             <a:endParaRPr lang="en-US"/>
           </a:p>
@@ -2897,7 +2899,7 @@
             <a:fld id="{9CAD6738-AE48-490E-BA60-16B31C3E5798}" type="datetime1">
               <a:rPr lang="en-US" smtClean="0"/>
               <a:pPr/>
-              <a:t>5/7/2018</a:t>
+              <a:t>5/9/2020</a:t>
             </a:fld>
             <a:endParaRPr lang="en-US"/>
           </a:p>
@@ -3324,7 +3326,7 @@
             <a:fld id="{12137309-80BC-4890-B91A-AB9885E172E5}" type="datetime1">
               <a:rPr lang="en-US" smtClean="0"/>
               <a:pPr/>
-              <a:t>5/7/2018</a:t>
+              <a:t>5/9/2020</a:t>
             </a:fld>
             <a:endParaRPr lang="en-US"/>
           </a:p>
@@ -3447,7 +3449,7 @@
             <a:fld id="{79C16A63-0F78-4E9D-81E4-A84E1F25A0A3}" type="datetime1">
               <a:rPr lang="en-US" smtClean="0"/>
               <a:pPr/>
-              <a:t>5/7/2018</a:t>
+              <a:t>5/9/2020</a:t>
             </a:fld>
             <a:endParaRPr lang="en-US"/>
           </a:p>
@@ -3547,7 +3549,7 @@
             <a:fld id="{DC5FF9E9-979C-4422-A1BB-1DC64426F0DA}" type="datetime1">
               <a:rPr lang="en-US" smtClean="0"/>
               <a:pPr/>
-              <a:t>5/7/2018</a:t>
+              <a:t>5/9/2020</a:t>
             </a:fld>
             <a:endParaRPr lang="en-US"/>
           </a:p>
@@ -3829,7 +3831,7 @@
             <a:fld id="{B9B7020D-910B-4676-A902-AD52382F28B6}" type="datetime1">
               <a:rPr lang="en-US" smtClean="0"/>
               <a:pPr/>
-              <a:t>5/7/2018</a:t>
+              <a:t>5/9/2020</a:t>
             </a:fld>
             <a:endParaRPr lang="en-US"/>
           </a:p>
@@ -4087,7 +4089,7 @@
             <a:fld id="{4695FF79-924D-47D6-A727-6A03000C0C91}" type="datetime1">
               <a:rPr lang="en-US" smtClean="0"/>
               <a:pPr/>
-              <a:t>5/7/2018</a:t>
+              <a:t>5/9/2020</a:t>
             </a:fld>
             <a:endParaRPr lang="en-US"/>
           </a:p>
@@ -4305,7 +4307,7 @@
             <a:fld id="{A51E304D-C692-4D58-A925-D35D66927263}" type="datetime1">
               <a:rPr lang="en-US" smtClean="0"/>
               <a:pPr/>
-              <a:t>5/7/2018</a:t>
+              <a:t>5/9/2020</a:t>
             </a:fld>
             <a:endParaRPr lang="en-US"/>
           </a:p>
@@ -4832,8 +4834,13 @@
             </a:r>
             <a:r>
               <a:rPr lang="en-US" dirty="0"/>
-              <a:t>from SVN</a:t>
-            </a:r>
+              <a:t>from </a:t>
+            </a:r>
+            <a:r>
+              <a:rPr lang="en-US" dirty="0" smtClean="0"/>
+              <a:t>repo</a:t>
+            </a:r>
+            <a:endParaRPr lang="en-US" dirty="0"/>
           </a:p>
         </p:txBody>
       </p:sp>
@@ -4897,1183 +4904,6 @@
           </a:p>
         </p:txBody>
       </p:sp>
-      <p:sp>
-        <p:nvSpPr>
-          <p:cNvPr id="5" name="TextBox 4"/>
-          <p:cNvSpPr txBox="1"/>
-          <p:nvPr/>
-        </p:nvSpPr>
-        <p:spPr>
-          <a:xfrm>
-            <a:off x="347194" y="1417638"/>
-            <a:ext cx="8449612" cy="1569660"/>
-          </a:xfrm>
-          <a:prstGeom prst="rect">
-            <a:avLst/>
-          </a:prstGeom>
-          <a:noFill/>
-        </p:spPr>
-        <p:txBody>
-          <a:bodyPr wrap="square" rtlCol="0">
-            <a:spAutoFit/>
-          </a:bodyPr>
-          <a:lstStyle/>
-          <a:p>
-            <a:r>
-              <a:rPr lang="en-US" sz="2400" dirty="0" smtClean="0"/>
-              <a:t>When we have multiple objects which interact with the same object, we can use </a:t>
-            </a:r>
-            <a:r>
-              <a:rPr lang="en-US" sz="2400" b="1" i="1" dirty="0" smtClean="0"/>
-              <a:t>inheritance</a:t>
-            </a:r>
-            <a:r>
-              <a:rPr lang="en-US" sz="2400" dirty="0" smtClean="0"/>
-              <a:t> to help us make a design to deal with the collisions. We should have the classes which differ provide the functionality to deal with the collisions.</a:t>
-            </a:r>
-            <a:endParaRPr lang="en-US" sz="2400" dirty="0"/>
-          </a:p>
-        </p:txBody>
-      </p:sp>
-      <p:sp>
-        <p:nvSpPr>
-          <p:cNvPr id="6" name="TextBox 5"/>
-          <p:cNvSpPr txBox="1"/>
-          <p:nvPr/>
-        </p:nvSpPr>
-        <p:spPr>
-          <a:xfrm>
-            <a:off x="445168" y="3345468"/>
-            <a:ext cx="8449612" cy="2677656"/>
-          </a:xfrm>
-          <a:prstGeom prst="rect">
-            <a:avLst/>
-          </a:prstGeom>
-          <a:noFill/>
-        </p:spPr>
-        <p:txBody>
-          <a:bodyPr wrap="square" rtlCol="0">
-            <a:spAutoFit/>
-          </a:bodyPr>
-          <a:lstStyle/>
-          <a:p>
-            <a:r>
-              <a:rPr lang="en-US" sz="2400" dirty="0" smtClean="0"/>
-              <a:t>So in this case, the different drops (and </a:t>
-            </a:r>
-            <a:r>
-              <a:rPr lang="en-US" sz="2400" dirty="0" err="1" smtClean="0"/>
-              <a:t>InvincibilityDrop</a:t>
-            </a:r>
-            <a:r>
-              <a:rPr lang="en-US" sz="2400" dirty="0" smtClean="0"/>
-              <a:t>) differ in how they affect the platform. Thus, we can could create an </a:t>
-            </a:r>
-            <a:r>
-              <a:rPr lang="en-US" sz="2400" dirty="0"/>
-              <a:t>a</a:t>
-            </a:r>
-            <a:r>
-              <a:rPr lang="en-US" sz="2400" dirty="0" smtClean="0"/>
-              <a:t>bstract class and require an implementation of the </a:t>
-            </a:r>
-            <a:r>
-              <a:rPr lang="en-US" sz="2400" dirty="0" err="1" smtClean="0"/>
-              <a:t>collideWith</a:t>
-            </a:r>
-            <a:r>
-              <a:rPr lang="en-US" sz="2400" dirty="0" smtClean="0"/>
-              <a:t>(</a:t>
-            </a:r>
-            <a:r>
-              <a:rPr lang="en-US" sz="2400" dirty="0" err="1" smtClean="0"/>
-              <a:t>BouncingPlatform</a:t>
-            </a:r>
-            <a:r>
-              <a:rPr lang="en-US" sz="2400" dirty="0" smtClean="0"/>
-              <a:t>) method. Similarly, we can provide a </a:t>
-            </a:r>
-            <a:r>
-              <a:rPr lang="en-US" sz="2400" dirty="0" err="1" smtClean="0"/>
-              <a:t>collideWith</a:t>
-            </a:r>
-            <a:r>
-              <a:rPr lang="en-US" sz="2400" dirty="0" smtClean="0"/>
-              <a:t>( </a:t>
-            </a:r>
-            <a:r>
-              <a:rPr lang="en-US" sz="2400" dirty="0" err="1" smtClean="0"/>
-              <a:t>UserControlledPlatform</a:t>
-            </a:r>
-            <a:r>
-              <a:rPr lang="en-US" sz="2400" dirty="0" smtClean="0"/>
-              <a:t>) method, this will allow us to put the code in the drop classes and make the processing MUCH cleaner as we will see.</a:t>
-            </a:r>
-            <a:endParaRPr lang="en-US" sz="2400" dirty="0"/>
-          </a:p>
-        </p:txBody>
-      </p:sp>
-    </p:spTree>
-    <p:extLst>
-      <p:ext uri="{BB962C8B-B14F-4D97-AF65-F5344CB8AC3E}">
-        <p14:creationId xmlns:p14="http://schemas.microsoft.com/office/powerpoint/2010/main" val="286113809"/>
-      </p:ext>
-    </p:extLst>
-  </p:cSld>
-  <p:clrMapOvr>
-    <a:masterClrMapping/>
-  </p:clrMapOvr>
-</p:sld>
-</file>
-
-<file path=ppt/slides/slide11.xml><?xml version="1.0" encoding="utf-8"?>
-<p:sld xmlns:a="http://schemas.openxmlformats.org/drawingml/2006/main" xmlns:r="http://schemas.openxmlformats.org/officeDocument/2006/relationships" xmlns:p="http://schemas.openxmlformats.org/presentationml/2006/main">
-  <p:cSld>
-    <p:spTree>
-      <p:nvGrpSpPr>
-        <p:cNvPr id="1" name=""/>
-        <p:cNvGrpSpPr/>
-        <p:nvPr/>
-      </p:nvGrpSpPr>
-      <p:grpSpPr>
-        <a:xfrm>
-          <a:off x="0" y="0"/>
-          <a:ext cx="0" cy="0"/>
-          <a:chOff x="0" y="0"/>
-          <a:chExt cx="0" cy="0"/>
-        </a:xfrm>
-      </p:grpSpPr>
-      <p:sp>
-        <p:nvSpPr>
-          <p:cNvPr id="2" name="Title 1"/>
-          <p:cNvSpPr>
-            <a:spLocks noGrp="1"/>
-          </p:cNvSpPr>
-          <p:nvPr>
-            <p:ph type="title"/>
-          </p:nvPr>
-        </p:nvSpPr>
-        <p:spPr/>
-        <p:txBody>
-          <a:bodyPr/>
-          <a:lstStyle/>
-          <a:p>
-            <a:r>
-              <a:rPr lang="en-US" dirty="0" smtClean="0"/>
-              <a:t>Live-coding</a:t>
-            </a:r>
-            <a:endParaRPr lang="en-US" dirty="0"/>
-          </a:p>
-        </p:txBody>
-      </p:sp>
-      <p:sp>
-        <p:nvSpPr>
-          <p:cNvPr id="3" name="Content Placeholder 2"/>
-          <p:cNvSpPr>
-            <a:spLocks noGrp="1"/>
-          </p:cNvSpPr>
-          <p:nvPr>
-            <p:ph idx="1"/>
-          </p:nvPr>
-        </p:nvSpPr>
-        <p:spPr/>
-        <p:txBody>
-          <a:bodyPr/>
-          <a:lstStyle/>
-          <a:p>
-            <a:endParaRPr lang="en-US"/>
-          </a:p>
-        </p:txBody>
-      </p:sp>
-    </p:spTree>
-    <p:extLst>
-      <p:ext uri="{BB962C8B-B14F-4D97-AF65-F5344CB8AC3E}">
-        <p14:creationId xmlns:p14="http://schemas.microsoft.com/office/powerpoint/2010/main" val="714179036"/>
-      </p:ext>
-    </p:extLst>
-  </p:cSld>
-  <p:clrMapOvr>
-    <a:masterClrMapping/>
-  </p:clrMapOvr>
-</p:sld>
-</file>
-
-<file path=ppt/slides/slide12.xml><?xml version="1.0" encoding="utf-8"?>
-<p:sld xmlns:a="http://schemas.openxmlformats.org/drawingml/2006/main" xmlns:r="http://schemas.openxmlformats.org/officeDocument/2006/relationships" xmlns:p="http://schemas.openxmlformats.org/presentationml/2006/main">
-  <p:cSld>
-    <p:spTree>
-      <p:nvGrpSpPr>
-        <p:cNvPr id="1" name=""/>
-        <p:cNvGrpSpPr/>
-        <p:nvPr/>
-      </p:nvGrpSpPr>
-      <p:grpSpPr>
-        <a:xfrm>
-          <a:off x="0" y="0"/>
-          <a:ext cx="0" cy="0"/>
-          <a:chOff x="0" y="0"/>
-          <a:chExt cx="0" cy="0"/>
-        </a:xfrm>
-      </p:grpSpPr>
-      <p:sp>
-        <p:nvSpPr>
-          <p:cNvPr id="2" name="Title 1"/>
-          <p:cNvSpPr>
-            <a:spLocks noGrp="1"/>
-          </p:cNvSpPr>
-          <p:nvPr>
-            <p:ph type="title"/>
-          </p:nvPr>
-        </p:nvSpPr>
-        <p:spPr/>
-        <p:txBody>
-          <a:bodyPr/>
-          <a:lstStyle/>
-          <a:p>
-            <a:r>
-              <a:rPr lang="en-US" dirty="0" smtClean="0"/>
-              <a:t>Design Activity</a:t>
-            </a:r>
-            <a:endParaRPr lang="en-US" dirty="0"/>
-          </a:p>
-        </p:txBody>
-      </p:sp>
-      <p:sp>
-        <p:nvSpPr>
-          <p:cNvPr id="3" name="Content Placeholder 2"/>
-          <p:cNvSpPr>
-            <a:spLocks noGrp="1"/>
-          </p:cNvSpPr>
-          <p:nvPr>
-            <p:ph idx="1"/>
-          </p:nvPr>
-        </p:nvSpPr>
-        <p:spPr/>
-        <p:txBody>
-          <a:bodyPr/>
-          <a:lstStyle/>
-          <a:p>
-            <a:r>
-              <a:rPr lang="en-US" dirty="0" smtClean="0"/>
-              <a:t>Hand out </a:t>
-            </a:r>
-            <a:endParaRPr lang="en-US" dirty="0"/>
-          </a:p>
-        </p:txBody>
-      </p:sp>
-    </p:spTree>
-    <p:extLst>
-      <p:ext uri="{BB962C8B-B14F-4D97-AF65-F5344CB8AC3E}">
-        <p14:creationId xmlns:p14="http://schemas.microsoft.com/office/powerpoint/2010/main" val="3038993397"/>
-      </p:ext>
-    </p:extLst>
-  </p:cSld>
-  <p:clrMapOvr>
-    <a:masterClrMapping/>
-  </p:clrMapOvr>
-</p:sld>
-</file>
-
-<file path=ppt/slides/slide13.xml><?xml version="1.0" encoding="utf-8"?>
-<p:sld xmlns:a="http://schemas.openxmlformats.org/drawingml/2006/main" xmlns:r="http://schemas.openxmlformats.org/officeDocument/2006/relationships" xmlns:p="http://schemas.openxmlformats.org/presentationml/2006/main">
-  <p:cSld>
-    <p:spTree>
-      <p:nvGrpSpPr>
-        <p:cNvPr id="1" name=""/>
-        <p:cNvGrpSpPr/>
-        <p:nvPr/>
-      </p:nvGrpSpPr>
-      <p:grpSpPr>
-        <a:xfrm>
-          <a:off x="0" y="0"/>
-          <a:ext cx="0" cy="0"/>
-          <a:chOff x="0" y="0"/>
-          <a:chExt cx="0" cy="0"/>
-        </a:xfrm>
-      </p:grpSpPr>
-      <p:sp>
-        <p:nvSpPr>
-          <p:cNvPr id="3" name="Content Placeholder 2"/>
-          <p:cNvSpPr>
-            <a:spLocks noGrp="1"/>
-          </p:cNvSpPr>
-          <p:nvPr>
-            <p:ph idx="1"/>
-          </p:nvPr>
-        </p:nvSpPr>
-        <p:spPr>
-          <a:xfrm>
-            <a:off x="152400" y="533400"/>
-            <a:ext cx="8686800" cy="2133600"/>
-          </a:xfrm>
-        </p:spPr>
-        <p:txBody>
-          <a:bodyPr>
-            <a:normAutofit fontScale="85000" lnSpcReduction="20000"/>
-          </a:bodyPr>
-          <a:lstStyle/>
-          <a:p>
-            <a:pPr marL="0" indent="0">
-              <a:buNone/>
-            </a:pPr>
-            <a:r>
-              <a:rPr lang="en-US" dirty="0" smtClean="0"/>
-              <a:t>In </a:t>
-            </a:r>
-            <a:r>
-              <a:rPr lang="en-US" dirty="0"/>
-              <a:t>the </a:t>
-            </a:r>
-            <a:r>
-              <a:rPr lang="en-US" dirty="0" smtClean="0"/>
-              <a:t>game </a:t>
-            </a:r>
-            <a:r>
-              <a:rPr lang="en-US" dirty="0" err="1"/>
-              <a:t>Bomberman</a:t>
-            </a:r>
-            <a:r>
-              <a:rPr lang="en-US" dirty="0"/>
-              <a:t>, everything has special behavior if caught in a bomb explosion.  </a:t>
-            </a:r>
-            <a:r>
-              <a:rPr lang="en-US" dirty="0" smtClean="0"/>
-              <a:t>Heroes </a:t>
-            </a:r>
-            <a:r>
-              <a:rPr lang="en-US" dirty="0"/>
-              <a:t>die and restart the level, monsters are killed and score points, walls are destroyed, and bombs explode themselves.  In the design below, the Bomb class has an </a:t>
-            </a:r>
-            <a:r>
-              <a:rPr lang="en-US" dirty="0" err="1"/>
-              <a:t>onExplosion</a:t>
-            </a:r>
-            <a:r>
-              <a:rPr lang="en-US" dirty="0"/>
-              <a:t> method which handles this behavior and (you can assume) works correctly</a:t>
-            </a:r>
-            <a:r>
-              <a:rPr lang="en-US" dirty="0" smtClean="0"/>
-              <a:t>.</a:t>
-            </a:r>
-            <a:endParaRPr lang="en-US" dirty="0"/>
-          </a:p>
-        </p:txBody>
-      </p:sp>
-      <p:pic>
-        <p:nvPicPr>
-          <p:cNvPr id="2" name="Picture 1"/>
-          <p:cNvPicPr>
-            <a:picLocks noChangeAspect="1"/>
-          </p:cNvPicPr>
-          <p:nvPr/>
-        </p:nvPicPr>
-        <p:blipFill>
-          <a:blip r:embed="rId2"/>
-          <a:stretch>
-            <a:fillRect/>
-          </a:stretch>
-        </p:blipFill>
-        <p:spPr>
-          <a:xfrm>
-            <a:off x="533400" y="2667000"/>
-            <a:ext cx="8153400" cy="4072274"/>
-          </a:xfrm>
-          <a:prstGeom prst="rect">
-            <a:avLst/>
-          </a:prstGeom>
-        </p:spPr>
-      </p:pic>
-    </p:spTree>
-    <p:extLst>
-      <p:ext uri="{BB962C8B-B14F-4D97-AF65-F5344CB8AC3E}">
-        <p14:creationId xmlns:p14="http://schemas.microsoft.com/office/powerpoint/2010/main" val="862967812"/>
-      </p:ext>
-    </p:extLst>
-  </p:cSld>
-  <p:clrMapOvr>
-    <a:masterClrMapping/>
-  </p:clrMapOvr>
-</p:sld>
-</file>
-
-<file path=ppt/slides/slide14.xml><?xml version="1.0" encoding="utf-8"?>
-<p:sld xmlns:a="http://schemas.openxmlformats.org/drawingml/2006/main" xmlns:r="http://schemas.openxmlformats.org/officeDocument/2006/relationships" xmlns:p="http://schemas.openxmlformats.org/presentationml/2006/main">
-  <p:cSld>
-    <p:spTree>
-      <p:nvGrpSpPr>
-        <p:cNvPr id="1" name=""/>
-        <p:cNvGrpSpPr/>
-        <p:nvPr/>
-      </p:nvGrpSpPr>
-      <p:grpSpPr>
-        <a:xfrm>
-          <a:off x="0" y="0"/>
-          <a:ext cx="0" cy="0"/>
-          <a:chOff x="0" y="0"/>
-          <a:chExt cx="0" cy="0"/>
-        </a:xfrm>
-      </p:grpSpPr>
-      <p:sp>
-        <p:nvSpPr>
-          <p:cNvPr id="2" name="Title 1"/>
-          <p:cNvSpPr>
-            <a:spLocks noGrp="1"/>
-          </p:cNvSpPr>
-          <p:nvPr>
-            <p:ph type="title"/>
-          </p:nvPr>
-        </p:nvSpPr>
-        <p:spPr/>
-        <p:txBody>
-          <a:bodyPr/>
-          <a:lstStyle/>
-          <a:p>
-            <a:r>
-              <a:rPr lang="en-US" dirty="0" smtClean="0"/>
-              <a:t>Collision Code</a:t>
-            </a:r>
-            <a:endParaRPr lang="en-US" dirty="0"/>
-          </a:p>
-        </p:txBody>
-      </p:sp>
-      <p:sp>
-        <p:nvSpPr>
-          <p:cNvPr id="3" name="Content Placeholder 2"/>
-          <p:cNvSpPr>
-            <a:spLocks noGrp="1"/>
-          </p:cNvSpPr>
-          <p:nvPr>
-            <p:ph idx="1"/>
-          </p:nvPr>
-        </p:nvSpPr>
-        <p:spPr>
-          <a:xfrm>
-            <a:off x="457200" y="1177410"/>
-            <a:ext cx="8229600" cy="4525963"/>
-          </a:xfrm>
-        </p:spPr>
-        <p:txBody>
-          <a:bodyPr>
-            <a:normAutofit fontScale="85000" lnSpcReduction="20000"/>
-          </a:bodyPr>
-          <a:lstStyle/>
-          <a:p>
-            <a:pPr marL="0" indent="0">
-              <a:buNone/>
-            </a:pPr>
-            <a:r>
-              <a:rPr lang="en-US" dirty="0"/>
-              <a:t>for(</a:t>
-            </a:r>
-            <a:r>
-              <a:rPr lang="en-US" dirty="0" err="1"/>
-              <a:t>GameObject</a:t>
-            </a:r>
-            <a:r>
-              <a:rPr lang="en-US" dirty="0"/>
-              <a:t> g : </a:t>
-            </a:r>
-            <a:r>
-              <a:rPr lang="en-US" dirty="0" err="1"/>
-              <a:t>getObjectsWithinBombExplosion</a:t>
-            </a:r>
-            <a:r>
-              <a:rPr lang="en-US" dirty="0"/>
-              <a:t>()) {</a:t>
-            </a:r>
-          </a:p>
-          <a:p>
-            <a:pPr marL="0" indent="0">
-              <a:buNone/>
-            </a:pPr>
-            <a:r>
-              <a:rPr lang="en-US" dirty="0"/>
-              <a:t/>
-            </a:r>
-            <a:br>
-              <a:rPr lang="en-US" dirty="0"/>
-            </a:br>
-            <a:r>
-              <a:rPr lang="en-US" dirty="0"/>
-              <a:t>if(g </a:t>
-            </a:r>
-            <a:r>
-              <a:rPr lang="en-US" dirty="0" err="1"/>
-              <a:t>instanceof</a:t>
-            </a:r>
-            <a:r>
-              <a:rPr lang="en-US" dirty="0"/>
-              <a:t> Bomb) {</a:t>
-            </a:r>
-          </a:p>
-          <a:p>
-            <a:pPr marL="0" indent="0">
-              <a:buNone/>
-            </a:pPr>
-            <a:r>
-              <a:rPr lang="en-US" dirty="0"/>
-              <a:t>    // bomb specific code</a:t>
-            </a:r>
-          </a:p>
-          <a:p>
-            <a:pPr marL="0" indent="0">
-              <a:buNone/>
-            </a:pPr>
-            <a:r>
-              <a:rPr lang="en-US" dirty="0"/>
-              <a:t>}</a:t>
-            </a:r>
-          </a:p>
-          <a:p>
-            <a:pPr marL="0" indent="0">
-              <a:buNone/>
-            </a:pPr>
-            <a:r>
-              <a:rPr lang="en-US" dirty="0"/>
-              <a:t>if(g </a:t>
-            </a:r>
-            <a:r>
-              <a:rPr lang="en-US" dirty="0" err="1"/>
-              <a:t>instanceof</a:t>
-            </a:r>
-            <a:r>
-              <a:rPr lang="en-US" dirty="0"/>
-              <a:t> Wall) {</a:t>
-            </a:r>
-          </a:p>
-          <a:p>
-            <a:pPr marL="0" indent="0">
-              <a:buNone/>
-            </a:pPr>
-            <a:r>
-              <a:rPr lang="en-US" dirty="0"/>
-              <a:t>    //wall specific code</a:t>
-            </a:r>
-          </a:p>
-          <a:p>
-            <a:pPr marL="0" indent="0">
-              <a:buNone/>
-            </a:pPr>
-            <a:r>
-              <a:rPr lang="en-US" dirty="0"/>
-              <a:t>}</a:t>
-            </a:r>
-          </a:p>
-          <a:p>
-            <a:pPr marL="0" indent="0">
-              <a:buNone/>
-            </a:pPr>
-            <a:r>
-              <a:rPr lang="en-US" dirty="0"/>
-              <a:t>//pattern continues...</a:t>
-            </a:r>
-          </a:p>
-          <a:p>
-            <a:pPr marL="0" indent="0">
-              <a:buNone/>
-            </a:pPr>
-            <a:r>
-              <a:rPr lang="en-US" dirty="0" smtClean="0"/>
-              <a:t>}</a:t>
-            </a:r>
-            <a:r>
-              <a:rPr lang="en-US" dirty="0"/>
-              <a:t/>
-            </a:r>
-            <a:br>
-              <a:rPr lang="en-US" dirty="0"/>
-            </a:br>
-            <a:endParaRPr lang="en-US" dirty="0"/>
-          </a:p>
-        </p:txBody>
-      </p:sp>
-      <p:sp>
-        <p:nvSpPr>
-          <p:cNvPr id="5" name="TextBox 4"/>
-          <p:cNvSpPr txBox="1"/>
-          <p:nvPr/>
-        </p:nvSpPr>
-        <p:spPr>
-          <a:xfrm>
-            <a:off x="457200" y="5317436"/>
-            <a:ext cx="8458200" cy="1754326"/>
-          </a:xfrm>
-          <a:prstGeom prst="rect">
-            <a:avLst/>
-          </a:prstGeom>
-          <a:noFill/>
-        </p:spPr>
-        <p:txBody>
-          <a:bodyPr wrap="square" rtlCol="0">
-            <a:spAutoFit/>
-          </a:bodyPr>
-          <a:lstStyle/>
-          <a:p>
-            <a:r>
-              <a:rPr lang="en-US" dirty="0" smtClean="0"/>
-              <a:t>1</a:t>
-            </a:r>
-            <a:r>
-              <a:rPr lang="en-US" dirty="0"/>
-              <a:t>. What is wrong with the design?</a:t>
-            </a:r>
-          </a:p>
-          <a:p>
-            <a:r>
-              <a:rPr lang="en-US" dirty="0"/>
-              <a:t>2. Propose a new design that does not have the problem you identified in #1.  You only need include in your UML diagram classes that are *different* from their version in the given diagram</a:t>
-            </a:r>
-            <a:r>
-              <a:rPr lang="en-US" dirty="0" smtClean="0"/>
-              <a:t>.</a:t>
-            </a:r>
-            <a:r>
-              <a:rPr lang="en-US" dirty="0"/>
-              <a:t/>
-            </a:r>
-            <a:br>
-              <a:rPr lang="en-US" dirty="0"/>
-            </a:br>
-            <a:r>
-              <a:rPr lang="en-US" dirty="0"/>
-              <a:t>Also include a sample for what the analogous code on </a:t>
-            </a:r>
-            <a:r>
-              <a:rPr lang="en-US" dirty="0" err="1"/>
-              <a:t>onExplosion</a:t>
-            </a:r>
-            <a:r>
-              <a:rPr lang="en-US" dirty="0"/>
-              <a:t> looks like</a:t>
-            </a:r>
-            <a:endParaRPr lang="en-US" dirty="0" smtClean="0"/>
-          </a:p>
-          <a:p>
-            <a:endParaRPr lang="en-US" dirty="0"/>
-          </a:p>
-        </p:txBody>
-      </p:sp>
-      <p:pic>
-        <p:nvPicPr>
-          <p:cNvPr id="6" name="Picture 5"/>
-          <p:cNvPicPr>
-            <a:picLocks noChangeAspect="1"/>
-          </p:cNvPicPr>
-          <p:nvPr/>
-        </p:nvPicPr>
-        <p:blipFill>
-          <a:blip r:embed="rId3"/>
-          <a:stretch>
-            <a:fillRect/>
-          </a:stretch>
-        </p:blipFill>
-        <p:spPr>
-          <a:xfrm>
-            <a:off x="3845457" y="2590800"/>
-            <a:ext cx="5149091" cy="2571750"/>
-          </a:xfrm>
-          <a:prstGeom prst="rect">
-            <a:avLst/>
-          </a:prstGeom>
-        </p:spPr>
-      </p:pic>
-    </p:spTree>
-    <p:extLst>
-      <p:ext uri="{BB962C8B-B14F-4D97-AF65-F5344CB8AC3E}">
-        <p14:creationId xmlns:p14="http://schemas.microsoft.com/office/powerpoint/2010/main" val="2717704157"/>
-      </p:ext>
-    </p:extLst>
-  </p:cSld>
-  <p:clrMapOvr>
-    <a:masterClrMapping/>
-  </p:clrMapOvr>
-</p:sld>
-</file>
-
-<file path=ppt/slides/slide15.xml><?xml version="1.0" encoding="utf-8"?>
-<p:sld xmlns:a="http://schemas.openxmlformats.org/drawingml/2006/main" xmlns:r="http://schemas.openxmlformats.org/officeDocument/2006/relationships" xmlns:p="http://schemas.openxmlformats.org/presentationml/2006/main" show="0">
-  <p:cSld>
-    <p:spTree>
-      <p:nvGrpSpPr>
-        <p:cNvPr id="1" name=""/>
-        <p:cNvGrpSpPr/>
-        <p:nvPr/>
-      </p:nvGrpSpPr>
-      <p:grpSpPr>
-        <a:xfrm>
-          <a:off x="0" y="0"/>
-          <a:ext cx="0" cy="0"/>
-          <a:chOff x="0" y="0"/>
-          <a:chExt cx="0" cy="0"/>
-        </a:xfrm>
-      </p:grpSpPr>
-      <p:sp>
-        <p:nvSpPr>
-          <p:cNvPr id="2" name="Title 1"/>
-          <p:cNvSpPr>
-            <a:spLocks noGrp="1"/>
-          </p:cNvSpPr>
-          <p:nvPr>
-            <p:ph type="title"/>
-          </p:nvPr>
-        </p:nvSpPr>
-        <p:spPr/>
-        <p:txBody>
-          <a:bodyPr/>
-          <a:lstStyle/>
-          <a:p>
-            <a:r>
-              <a:rPr lang="en-US" dirty="0" smtClean="0"/>
-              <a:t>A Solution</a:t>
-            </a:r>
-            <a:endParaRPr lang="en-US" dirty="0"/>
-          </a:p>
-        </p:txBody>
-      </p:sp>
-      <p:sp>
-        <p:nvSpPr>
-          <p:cNvPr id="3" name="Content Placeholder 2"/>
-          <p:cNvSpPr>
-            <a:spLocks noGrp="1"/>
-          </p:cNvSpPr>
-          <p:nvPr>
-            <p:ph idx="1"/>
-          </p:nvPr>
-        </p:nvSpPr>
-        <p:spPr/>
-        <p:txBody>
-          <a:bodyPr/>
-          <a:lstStyle/>
-          <a:p>
-            <a:endParaRPr lang="en-US"/>
-          </a:p>
-        </p:txBody>
-      </p:sp>
-      <p:pic>
-        <p:nvPicPr>
-          <p:cNvPr id="4" name="Picture 3"/>
-          <p:cNvPicPr>
-            <a:picLocks noChangeAspect="1"/>
-          </p:cNvPicPr>
-          <p:nvPr/>
-        </p:nvPicPr>
-        <p:blipFill>
-          <a:blip r:embed="rId2"/>
-          <a:stretch>
-            <a:fillRect/>
-          </a:stretch>
-        </p:blipFill>
-        <p:spPr>
-          <a:xfrm>
-            <a:off x="403905" y="1506538"/>
-            <a:ext cx="8372475" cy="4619625"/>
-          </a:xfrm>
-          <a:prstGeom prst="rect">
-            <a:avLst/>
-          </a:prstGeom>
-        </p:spPr>
-      </p:pic>
-    </p:spTree>
-    <p:extLst>
-      <p:ext uri="{BB962C8B-B14F-4D97-AF65-F5344CB8AC3E}">
-        <p14:creationId xmlns:p14="http://schemas.microsoft.com/office/powerpoint/2010/main" val="2927449891"/>
-      </p:ext>
-    </p:extLst>
-  </p:cSld>
-  <p:clrMapOvr>
-    <a:masterClrMapping/>
-  </p:clrMapOvr>
-  <mc:AlternateContent xmlns:mc="http://schemas.openxmlformats.org/markup-compatibility/2006">
-    <mc:Choice xmlns:p14="http://schemas.microsoft.com/office/powerpoint/2010/main" Requires="p14">
-      <p:transition spd="slow" p14:dur="2000"/>
-    </mc:Choice>
-    <mc:Fallback>
-      <p:transition spd="slow"/>
-    </mc:Fallback>
-  </mc:AlternateContent>
-</p:sld>
-</file>
-
-<file path=ppt/slides/slide16.xml><?xml version="1.0" encoding="utf-8"?>
-<p:sld xmlns:a="http://schemas.openxmlformats.org/drawingml/2006/main" xmlns:r="http://schemas.openxmlformats.org/officeDocument/2006/relationships" xmlns:p="http://schemas.openxmlformats.org/presentationml/2006/main" show="0">
-  <p:cSld>
-    <p:spTree>
-      <p:nvGrpSpPr>
-        <p:cNvPr id="1" name=""/>
-        <p:cNvGrpSpPr/>
-        <p:nvPr/>
-      </p:nvGrpSpPr>
-      <p:grpSpPr>
-        <a:xfrm>
-          <a:off x="0" y="0"/>
-          <a:ext cx="0" cy="0"/>
-          <a:chOff x="0" y="0"/>
-          <a:chExt cx="0" cy="0"/>
-        </a:xfrm>
-      </p:grpSpPr>
-      <p:sp>
-        <p:nvSpPr>
-          <p:cNvPr id="3" name="Content Placeholder 2"/>
-          <p:cNvSpPr>
-            <a:spLocks noGrp="1"/>
-          </p:cNvSpPr>
-          <p:nvPr>
-            <p:ph idx="1"/>
-          </p:nvPr>
-        </p:nvSpPr>
-        <p:spPr>
-          <a:xfrm>
-            <a:off x="457200" y="4313237"/>
-            <a:ext cx="8229600" cy="2544763"/>
-          </a:xfrm>
-        </p:spPr>
-        <p:txBody>
-          <a:bodyPr>
-            <a:normAutofit fontScale="55000" lnSpcReduction="20000"/>
-          </a:bodyPr>
-          <a:lstStyle/>
-          <a:p>
-            <a:pPr marL="0" indent="0">
-              <a:buNone/>
-            </a:pPr>
-            <a:r>
-              <a:rPr lang="en-US" dirty="0"/>
-              <a:t>Each subclass will process the effects of a collision inside of the </a:t>
-            </a:r>
-            <a:r>
-              <a:rPr lang="en-US" dirty="0" err="1"/>
-              <a:t>collideWithExplodingBomb</a:t>
-            </a:r>
-            <a:r>
-              <a:rPr lang="en-US" dirty="0"/>
-              <a:t> method. No </a:t>
-            </a:r>
-            <a:r>
-              <a:rPr lang="en-US" dirty="0" err="1"/>
-              <a:t>instanceof</a:t>
-            </a:r>
-            <a:r>
-              <a:rPr lang="en-US" dirty="0"/>
-              <a:t> is required. Additionally, the code to handle collisions can be </a:t>
-            </a:r>
-            <a:r>
-              <a:rPr lang="en-US" dirty="0" smtClean="0"/>
-              <a:t>done inside </a:t>
-            </a:r>
-            <a:r>
-              <a:rPr lang="en-US" dirty="0" err="1" smtClean="0"/>
-              <a:t>onExplosion</a:t>
-            </a:r>
-            <a:r>
-              <a:rPr lang="en-US" dirty="0" smtClean="0"/>
-              <a:t> as before:</a:t>
-            </a:r>
-            <a:endParaRPr lang="en-US" dirty="0"/>
-          </a:p>
-          <a:p>
-            <a:pPr marL="0" indent="0">
-              <a:buNone/>
-            </a:pPr>
-            <a:r>
-              <a:rPr lang="en-US" dirty="0"/>
-              <a:t/>
-            </a:r>
-            <a:br>
-              <a:rPr lang="en-US" dirty="0"/>
-            </a:br>
-            <a:r>
-              <a:rPr lang="en-US" dirty="0" smtClean="0"/>
-              <a:t>for(</a:t>
-            </a:r>
-            <a:r>
-              <a:rPr lang="en-US" dirty="0" err="1" smtClean="0"/>
-              <a:t>GameObject</a:t>
-            </a:r>
-            <a:r>
-              <a:rPr lang="en-US" dirty="0" smtClean="0"/>
-              <a:t> </a:t>
-            </a:r>
-            <a:r>
-              <a:rPr lang="en-US" dirty="0"/>
-              <a:t>g : </a:t>
-            </a:r>
-            <a:r>
-              <a:rPr lang="en-US" dirty="0" err="1"/>
-              <a:t>getObjectsWithinBombExplosion</a:t>
-            </a:r>
-            <a:r>
-              <a:rPr lang="en-US" dirty="0"/>
-              <a:t>()) {</a:t>
-            </a:r>
-            <a:endParaRPr lang="en-US" dirty="0"/>
-          </a:p>
-          <a:p>
-            <a:pPr marL="0" indent="0">
-              <a:buNone/>
-            </a:pPr>
-            <a:r>
-              <a:rPr lang="en-US" dirty="0" smtClean="0"/>
-              <a:t>	</a:t>
-            </a:r>
-            <a:r>
-              <a:rPr lang="en-US" dirty="0" err="1" smtClean="0"/>
-              <a:t>g.collideWithExplodingBomb</a:t>
-            </a:r>
-            <a:r>
-              <a:rPr lang="en-US" dirty="0" smtClean="0"/>
-              <a:t>(this</a:t>
-            </a:r>
-            <a:r>
-              <a:rPr lang="en-US" dirty="0"/>
-              <a:t>);</a:t>
-            </a:r>
-            <a:endParaRPr lang="en-US" dirty="0"/>
-          </a:p>
-          <a:p>
-            <a:pPr marL="0" indent="0">
-              <a:buNone/>
-            </a:pPr>
-            <a:r>
-              <a:rPr lang="en-US" dirty="0"/>
-              <a:t>}</a:t>
-            </a:r>
-            <a:endParaRPr lang="en-US" dirty="0"/>
-          </a:p>
-          <a:p>
-            <a:pPr marL="0" indent="0">
-              <a:buNone/>
-            </a:pPr>
-            <a:r>
-              <a:rPr lang="en-US" dirty="0"/>
-              <a:t/>
-            </a:r>
-            <a:br>
-              <a:rPr lang="en-US" dirty="0"/>
-            </a:br>
-            <a:r>
-              <a:rPr lang="en-US" dirty="0"/>
-              <a:t>Each subclass will deal with handling the class specific effects of being hit by a </a:t>
-            </a:r>
-            <a:r>
-              <a:rPr lang="en-US" dirty="0" smtClean="0"/>
-              <a:t>bomb</a:t>
-            </a:r>
-            <a:endParaRPr lang="en-US" dirty="0"/>
-          </a:p>
-        </p:txBody>
-      </p:sp>
-      <p:pic>
-        <p:nvPicPr>
-          <p:cNvPr id="4" name="Picture 3"/>
-          <p:cNvPicPr>
-            <a:picLocks noChangeAspect="1"/>
-          </p:cNvPicPr>
-          <p:nvPr/>
-        </p:nvPicPr>
-        <p:blipFill>
-          <a:blip r:embed="rId2"/>
-          <a:stretch>
-            <a:fillRect/>
-          </a:stretch>
-        </p:blipFill>
-        <p:spPr>
-          <a:xfrm>
-            <a:off x="1143000" y="274638"/>
-            <a:ext cx="6553200" cy="3615816"/>
-          </a:xfrm>
-          <a:prstGeom prst="rect">
-            <a:avLst/>
-          </a:prstGeom>
-        </p:spPr>
-      </p:pic>
-    </p:spTree>
-    <p:extLst>
-      <p:ext uri="{BB962C8B-B14F-4D97-AF65-F5344CB8AC3E}">
-        <p14:creationId xmlns:p14="http://schemas.microsoft.com/office/powerpoint/2010/main" val="2739635398"/>
-      </p:ext>
-    </p:extLst>
-  </p:cSld>
-  <p:clrMapOvr>
-    <a:masterClrMapping/>
-  </p:clrMapOvr>
-  <mc:AlternateContent xmlns:mc="http://schemas.openxmlformats.org/markup-compatibility/2006">
-    <mc:Choice xmlns:p14="http://schemas.microsoft.com/office/powerpoint/2010/main" Requires="p14">
-      <p:transition spd="slow" p14:dur="2000"/>
-    </mc:Choice>
-    <mc:Fallback>
-      <p:transition spd="slow"/>
-    </mc:Fallback>
-  </mc:AlternateContent>
-</p:sld>
-</file>
-
-<file path=ppt/slides/slide17.xml><?xml version="1.0" encoding="utf-8"?>
-<p:sld xmlns:a="http://schemas.openxmlformats.org/drawingml/2006/main" xmlns:r="http://schemas.openxmlformats.org/officeDocument/2006/relationships" xmlns:p="http://schemas.openxmlformats.org/presentationml/2006/main">
-  <p:cSld>
-    <p:spTree>
-      <p:nvGrpSpPr>
-        <p:cNvPr id="1" name=""/>
-        <p:cNvGrpSpPr/>
-        <p:nvPr/>
-      </p:nvGrpSpPr>
-      <p:grpSpPr>
-        <a:xfrm>
-          <a:off x="0" y="0"/>
-          <a:ext cx="0" cy="0"/>
-          <a:chOff x="0" y="0"/>
-          <a:chExt cx="0" cy="0"/>
-        </a:xfrm>
-      </p:grpSpPr>
-      <p:sp>
-        <p:nvSpPr>
-          <p:cNvPr id="4" name="Title 3"/>
-          <p:cNvSpPr>
-            <a:spLocks noGrp="1"/>
-          </p:cNvSpPr>
-          <p:nvPr>
-            <p:ph type="title"/>
-          </p:nvPr>
-        </p:nvSpPr>
-        <p:spPr/>
-        <p:txBody>
-          <a:bodyPr/>
-          <a:lstStyle/>
-          <a:p>
-            <a:pPr>
-              <a:defRPr/>
-            </a:pPr>
-            <a:r>
-              <a:rPr lang="en-US" dirty="0" smtClean="0">
-                <a:ea typeface="+mj-ea"/>
-                <a:cs typeface="+mj-cs"/>
-              </a:rPr>
-              <a:t>Team Project</a:t>
-            </a:r>
-            <a:endParaRPr lang="en-US" dirty="0">
-              <a:ea typeface="+mj-ea"/>
-              <a:cs typeface="+mj-cs"/>
-            </a:endParaRPr>
-          </a:p>
-        </p:txBody>
-      </p:sp>
-      <p:sp>
-        <p:nvSpPr>
-          <p:cNvPr id="29699" name="Text Placeholder 4"/>
-          <p:cNvSpPr>
-            <a:spLocks noGrp="1"/>
-          </p:cNvSpPr>
-          <p:nvPr>
-            <p:ph type="body" idx="1"/>
-          </p:nvPr>
-        </p:nvSpPr>
-        <p:spPr/>
-        <p:txBody>
-          <a:bodyPr/>
-          <a:lstStyle/>
-          <a:p>
-            <a:r>
-              <a:rPr lang="en-US" dirty="0" smtClean="0"/>
-              <a:t>Work time</a:t>
-            </a:r>
-          </a:p>
-          <a:p>
-            <a:r>
-              <a:rPr lang="en-US" i="1" dirty="0" smtClean="0"/>
-              <a:t>Be sure everyone is getting a chance to drive.</a:t>
-            </a:r>
-          </a:p>
-        </p:txBody>
-      </p:sp>
-    </p:spTree>
-    <p:extLst>
-      <p:ext uri="{BB962C8B-B14F-4D97-AF65-F5344CB8AC3E}">
-        <p14:creationId xmlns:p14="http://schemas.microsoft.com/office/powerpoint/2010/main" val="2413903598"/>
-      </p:ext>
-    </p:extLst>
-  </p:cSld>
-  <p:clrMapOvr>
-    <a:masterClrMapping/>
-  </p:clrMapOvr>
-  <p:transition/>
-  <p:timing>
-    <p:tnLst>
-      <p:par>
-        <p:cTn id="1" dur="indefinite" restart="never" nodeType="tmRoot"/>
-      </p:par>
-    </p:tnLst>
-  </p:timing>
-</p:sld>
-</file>
-
-<file path=ppt/slides/slide18.xml><?xml version="1.0" encoding="utf-8"?>
-<p:sld xmlns:a="http://schemas.openxmlformats.org/drawingml/2006/main" xmlns:r="http://schemas.openxmlformats.org/officeDocument/2006/relationships" xmlns:p="http://schemas.openxmlformats.org/presentationml/2006/main">
-  <p:cSld>
-    <p:spTree>
-      <p:nvGrpSpPr>
-        <p:cNvPr id="1" name=""/>
-        <p:cNvGrpSpPr/>
-        <p:nvPr/>
-      </p:nvGrpSpPr>
-      <p:grpSpPr>
-        <a:xfrm>
-          <a:off x="0" y="0"/>
-          <a:ext cx="0" cy="0"/>
-          <a:chOff x="0" y="0"/>
-          <a:chExt cx="0" cy="0"/>
-        </a:xfrm>
-      </p:grpSpPr>
-      <p:sp>
-        <p:nvSpPr>
-          <p:cNvPr id="2" name="Title 1"/>
-          <p:cNvSpPr>
-            <a:spLocks noGrp="1"/>
-          </p:cNvSpPr>
-          <p:nvPr>
-            <p:ph type="title"/>
-          </p:nvPr>
-        </p:nvSpPr>
-        <p:spPr/>
-        <p:txBody>
-          <a:bodyPr/>
-          <a:lstStyle/>
-          <a:p>
-            <a:r>
-              <a:rPr lang="en-US" dirty="0" smtClean="0"/>
-              <a:t>Platforms and Drops</a:t>
-            </a:r>
-            <a:endParaRPr lang="en-US" dirty="0"/>
-          </a:p>
-        </p:txBody>
-      </p:sp>
-      <p:sp>
-        <p:nvSpPr>
-          <p:cNvPr id="3" name="Content Placeholder 2"/>
-          <p:cNvSpPr>
-            <a:spLocks noGrp="1"/>
-          </p:cNvSpPr>
-          <p:nvPr>
-            <p:ph idx="1"/>
-          </p:nvPr>
-        </p:nvSpPr>
-        <p:spPr>
-          <a:xfrm>
-            <a:off x="152400" y="1600200"/>
-            <a:ext cx="8534400" cy="4525963"/>
-          </a:xfrm>
-        </p:spPr>
-        <p:txBody>
-          <a:bodyPr/>
-          <a:lstStyle/>
-          <a:p>
-            <a:r>
-              <a:rPr lang="en-US" dirty="0" smtClean="0"/>
-              <a:t>What if we wanted Platforms to collide as well?</a:t>
-            </a:r>
-            <a:endParaRPr lang="en-US" dirty="0"/>
-          </a:p>
-        </p:txBody>
-      </p:sp>
       <p:graphicFrame>
         <p:nvGraphicFramePr>
           <p:cNvPr id="4" name="Table 3"/>
@@ -6083,7 +4913,7 @@
           <p:nvPr>
             <p:extLst>
               <p:ext uri="{D42A27DB-BD31-4B8C-83A1-F6EECF244321}">
-                <p14:modId xmlns:p14="http://schemas.microsoft.com/office/powerpoint/2010/main" val="4284010156"/>
+                <p14:modId xmlns:p14="http://schemas.microsoft.com/office/powerpoint/2010/main" val="1625645834"/>
               </p:ext>
             </p:extLst>
           </p:nvPr>
@@ -6238,10 +5068,6 @@
                     <a:bodyPr/>
                     <a:lstStyle/>
                     <a:p>
-                      <a:r>
-                        <a:rPr lang="en-US" sz="2400" dirty="0" smtClean="0"/>
-                        <a:t>X</a:t>
-                      </a:r>
                       <a:endParaRPr lang="en-US" sz="2400" dirty="0"/>
                     </a:p>
                   </a:txBody>
@@ -6301,25 +5127,17 @@
                     <a:bodyPr/>
                     <a:lstStyle/>
                     <a:p>
-                      <a:r>
-                        <a:rPr lang="en-US" sz="2400" dirty="0" smtClean="0"/>
-                        <a:t>X</a:t>
-                      </a:r>
-                      <a:endParaRPr lang="en-US" sz="2400" dirty="0"/>
-                    </a:p>
-                  </a:txBody>
-                  <a:tcPr marL="129683" marR="129683" marT="64842" marB="64842"/>
-                </a:tc>
-                <a:tc>
-                  <a:txBody>
-                    <a:bodyPr/>
-                    <a:lstStyle/>
-                    <a:p>
-                      <a:r>
-                        <a:rPr lang="en-US" sz="2400" dirty="0" smtClean="0"/>
-                        <a:t>X</a:t>
-                      </a:r>
-                      <a:endParaRPr lang="en-US" sz="2400" dirty="0"/>
+                      <a:endParaRPr lang="en-US" sz="2400"/>
+                    </a:p>
+                  </a:txBody>
+                  <a:tcPr marL="129683" marR="129683" marT="64842" marB="64842"/>
+                </a:tc>
+                <a:tc>
+                  <a:txBody>
+                    <a:bodyPr/>
+                    <a:lstStyle/>
+                    <a:p>
+                      <a:endParaRPr lang="en-US" sz="2400"/>
                     </a:p>
                   </a:txBody>
                   <a:tcPr marL="129683" marR="129683" marT="64842" marB="64842"/>
@@ -6500,16 +5318,1256 @@
           </a:graphicData>
         </a:graphic>
       </p:graphicFrame>
+      <p:sp>
+        <p:nvSpPr>
+          <p:cNvPr id="5" name="TextBox 4"/>
+          <p:cNvSpPr txBox="1"/>
+          <p:nvPr/>
+        </p:nvSpPr>
+        <p:spPr>
+          <a:xfrm>
+            <a:off x="347194" y="1417638"/>
+            <a:ext cx="8449612" cy="1569660"/>
+          </a:xfrm>
+          <a:prstGeom prst="rect">
+            <a:avLst/>
+          </a:prstGeom>
+          <a:noFill/>
+        </p:spPr>
+        <p:txBody>
+          <a:bodyPr wrap="square" rtlCol="0">
+            <a:spAutoFit/>
+          </a:bodyPr>
+          <a:lstStyle/>
+          <a:p>
+            <a:r>
+              <a:rPr lang="en-US" sz="2400" dirty="0" smtClean="0"/>
+              <a:t>When we have multiple objects which interact with the same object, we can use </a:t>
+            </a:r>
+            <a:r>
+              <a:rPr lang="en-US" sz="2400" b="1" i="1" dirty="0" smtClean="0"/>
+              <a:t>inheritance</a:t>
+            </a:r>
+            <a:r>
+              <a:rPr lang="en-US" sz="2400" dirty="0" smtClean="0"/>
+              <a:t> to help us make a design to deal with the collisions. We should have the classes which differ provide the functionality to deal with the collisions.</a:t>
+            </a:r>
+            <a:endParaRPr lang="en-US" sz="2400" dirty="0"/>
+          </a:p>
+        </p:txBody>
+      </p:sp>
     </p:spTree>
     <p:extLst>
       <p:ext uri="{BB962C8B-B14F-4D97-AF65-F5344CB8AC3E}">
-        <p14:creationId xmlns:p14="http://schemas.microsoft.com/office/powerpoint/2010/main" val="3617275525"/>
+        <p14:creationId xmlns:p14="http://schemas.microsoft.com/office/powerpoint/2010/main" val="680180803"/>
       </p:ext>
     </p:extLst>
   </p:cSld>
   <p:clrMapOvr>
     <a:masterClrMapping/>
   </p:clrMapOvr>
+  <p:timing>
+    <p:tnLst>
+      <p:par>
+        <p:cTn id="1" dur="indefinite" restart="never" nodeType="tmRoot"/>
+      </p:par>
+    </p:tnLst>
+  </p:timing>
+</p:sld>
+</file>
+
+<file path=ppt/slides/slide11.xml><?xml version="1.0" encoding="utf-8"?>
+<p:sld xmlns:a="http://schemas.openxmlformats.org/drawingml/2006/main" xmlns:r="http://schemas.openxmlformats.org/officeDocument/2006/relationships" xmlns:p="http://schemas.openxmlformats.org/presentationml/2006/main">
+  <p:cSld>
+    <p:spTree>
+      <p:nvGrpSpPr>
+        <p:cNvPr id="1" name=""/>
+        <p:cNvGrpSpPr/>
+        <p:nvPr/>
+      </p:nvGrpSpPr>
+      <p:grpSpPr>
+        <a:xfrm>
+          <a:off x="0" y="0"/>
+          <a:ext cx="0" cy="0"/>
+          <a:chOff x="0" y="0"/>
+          <a:chExt cx="0" cy="0"/>
+        </a:xfrm>
+      </p:grpSpPr>
+      <p:sp>
+        <p:nvSpPr>
+          <p:cNvPr id="2" name="Title 1"/>
+          <p:cNvSpPr>
+            <a:spLocks noGrp="1"/>
+          </p:cNvSpPr>
+          <p:nvPr>
+            <p:ph type="title"/>
+          </p:nvPr>
+        </p:nvSpPr>
+        <p:spPr/>
+        <p:txBody>
+          <a:bodyPr/>
+          <a:lstStyle/>
+          <a:p>
+            <a:r>
+              <a:rPr lang="en-US" dirty="0" smtClean="0"/>
+              <a:t>Collision Chart</a:t>
+            </a:r>
+            <a:endParaRPr lang="en-US" dirty="0"/>
+          </a:p>
+        </p:txBody>
+      </p:sp>
+      <p:sp>
+        <p:nvSpPr>
+          <p:cNvPr id="5" name="TextBox 4"/>
+          <p:cNvSpPr txBox="1"/>
+          <p:nvPr/>
+        </p:nvSpPr>
+        <p:spPr>
+          <a:xfrm>
+            <a:off x="347194" y="1417638"/>
+            <a:ext cx="8449612" cy="1569660"/>
+          </a:xfrm>
+          <a:prstGeom prst="rect">
+            <a:avLst/>
+          </a:prstGeom>
+          <a:noFill/>
+        </p:spPr>
+        <p:txBody>
+          <a:bodyPr wrap="square" rtlCol="0">
+            <a:spAutoFit/>
+          </a:bodyPr>
+          <a:lstStyle/>
+          <a:p>
+            <a:r>
+              <a:rPr lang="en-US" sz="2400" dirty="0" smtClean="0"/>
+              <a:t>When we have multiple objects which interact with the same object, we can use </a:t>
+            </a:r>
+            <a:r>
+              <a:rPr lang="en-US" sz="2400" b="1" i="1" dirty="0" smtClean="0"/>
+              <a:t>inheritance</a:t>
+            </a:r>
+            <a:r>
+              <a:rPr lang="en-US" sz="2400" dirty="0" smtClean="0"/>
+              <a:t> to help us make a design to deal with the collisions. We should have the classes which differ provide the functionality to deal with the collisions.</a:t>
+            </a:r>
+            <a:endParaRPr lang="en-US" sz="2400" dirty="0"/>
+          </a:p>
+        </p:txBody>
+      </p:sp>
+      <p:sp>
+        <p:nvSpPr>
+          <p:cNvPr id="6" name="TextBox 5"/>
+          <p:cNvSpPr txBox="1"/>
+          <p:nvPr/>
+        </p:nvSpPr>
+        <p:spPr>
+          <a:xfrm>
+            <a:off x="445168" y="3345468"/>
+            <a:ext cx="8449612" cy="2677656"/>
+          </a:xfrm>
+          <a:prstGeom prst="rect">
+            <a:avLst/>
+          </a:prstGeom>
+          <a:noFill/>
+        </p:spPr>
+        <p:txBody>
+          <a:bodyPr wrap="square" rtlCol="0">
+            <a:spAutoFit/>
+          </a:bodyPr>
+          <a:lstStyle/>
+          <a:p>
+            <a:r>
+              <a:rPr lang="en-US" sz="2400" dirty="0" smtClean="0"/>
+              <a:t>So in this case, the different drops (and </a:t>
+            </a:r>
+            <a:r>
+              <a:rPr lang="en-US" sz="2400" dirty="0" err="1" smtClean="0"/>
+              <a:t>InvincibilityDrop</a:t>
+            </a:r>
+            <a:r>
+              <a:rPr lang="en-US" sz="2400" dirty="0" smtClean="0"/>
+              <a:t>) differ in how they affect the platform. Thus, we can could create an </a:t>
+            </a:r>
+            <a:r>
+              <a:rPr lang="en-US" sz="2400" dirty="0"/>
+              <a:t>a</a:t>
+            </a:r>
+            <a:r>
+              <a:rPr lang="en-US" sz="2400" dirty="0" smtClean="0"/>
+              <a:t>bstract class and require an implementation of the </a:t>
+            </a:r>
+            <a:r>
+              <a:rPr lang="en-US" sz="2400" dirty="0" err="1" smtClean="0"/>
+              <a:t>collideWith</a:t>
+            </a:r>
+            <a:r>
+              <a:rPr lang="en-US" sz="2400" dirty="0" smtClean="0"/>
+              <a:t>(</a:t>
+            </a:r>
+            <a:r>
+              <a:rPr lang="en-US" sz="2400" dirty="0" err="1" smtClean="0"/>
+              <a:t>BouncingPlatform</a:t>
+            </a:r>
+            <a:r>
+              <a:rPr lang="en-US" sz="2400" dirty="0" smtClean="0"/>
+              <a:t>) method. Similarly, we can provide a </a:t>
+            </a:r>
+            <a:r>
+              <a:rPr lang="en-US" sz="2400" dirty="0" err="1" smtClean="0"/>
+              <a:t>collideWith</a:t>
+            </a:r>
+            <a:r>
+              <a:rPr lang="en-US" sz="2400" dirty="0" smtClean="0"/>
+              <a:t>( </a:t>
+            </a:r>
+            <a:r>
+              <a:rPr lang="en-US" sz="2400" dirty="0" err="1" smtClean="0"/>
+              <a:t>UserControlledPlatform</a:t>
+            </a:r>
+            <a:r>
+              <a:rPr lang="en-US" sz="2400" dirty="0" smtClean="0"/>
+              <a:t>) method, this will allow us to put the code in the drop classes and make the processing MUCH cleaner as we will see.</a:t>
+            </a:r>
+            <a:endParaRPr lang="en-US" sz="2400" dirty="0"/>
+          </a:p>
+        </p:txBody>
+      </p:sp>
+    </p:spTree>
+    <p:extLst>
+      <p:ext uri="{BB962C8B-B14F-4D97-AF65-F5344CB8AC3E}">
+        <p14:creationId xmlns:p14="http://schemas.microsoft.com/office/powerpoint/2010/main" val="286113809"/>
+      </p:ext>
+    </p:extLst>
+  </p:cSld>
+  <p:clrMapOvr>
+    <a:masterClrMapping/>
+  </p:clrMapOvr>
+  <p:timing>
+    <p:tnLst>
+      <p:par>
+        <p:cTn id="1" dur="indefinite" restart="never" nodeType="tmRoot"/>
+      </p:par>
+    </p:tnLst>
+  </p:timing>
+</p:sld>
+</file>
+
+<file path=ppt/slides/slide12.xml><?xml version="1.0" encoding="utf-8"?>
+<p:sld xmlns:a="http://schemas.openxmlformats.org/drawingml/2006/main" xmlns:r="http://schemas.openxmlformats.org/officeDocument/2006/relationships" xmlns:p="http://schemas.openxmlformats.org/presentationml/2006/main">
+  <p:cSld>
+    <p:spTree>
+      <p:nvGrpSpPr>
+        <p:cNvPr id="1" name=""/>
+        <p:cNvGrpSpPr/>
+        <p:nvPr/>
+      </p:nvGrpSpPr>
+      <p:grpSpPr>
+        <a:xfrm>
+          <a:off x="0" y="0"/>
+          <a:ext cx="0" cy="0"/>
+          <a:chOff x="0" y="0"/>
+          <a:chExt cx="0" cy="0"/>
+        </a:xfrm>
+      </p:grpSpPr>
+      <p:sp>
+        <p:nvSpPr>
+          <p:cNvPr id="2" name="Title 1"/>
+          <p:cNvSpPr>
+            <a:spLocks noGrp="1"/>
+          </p:cNvSpPr>
+          <p:nvPr>
+            <p:ph type="title"/>
+          </p:nvPr>
+        </p:nvSpPr>
+        <p:spPr/>
+        <p:txBody>
+          <a:bodyPr/>
+          <a:lstStyle/>
+          <a:p>
+            <a:r>
+              <a:rPr lang="en-US" dirty="0" smtClean="0"/>
+              <a:t>Live-coding</a:t>
+            </a:r>
+            <a:endParaRPr lang="en-US" dirty="0"/>
+          </a:p>
+        </p:txBody>
+      </p:sp>
+      <p:sp>
+        <p:nvSpPr>
+          <p:cNvPr id="3" name="Content Placeholder 2"/>
+          <p:cNvSpPr>
+            <a:spLocks noGrp="1"/>
+          </p:cNvSpPr>
+          <p:nvPr>
+            <p:ph idx="1"/>
+          </p:nvPr>
+        </p:nvSpPr>
+        <p:spPr/>
+        <p:txBody>
+          <a:bodyPr/>
+          <a:lstStyle/>
+          <a:p>
+            <a:endParaRPr lang="en-US"/>
+          </a:p>
+        </p:txBody>
+      </p:sp>
+    </p:spTree>
+    <p:extLst>
+      <p:ext uri="{BB962C8B-B14F-4D97-AF65-F5344CB8AC3E}">
+        <p14:creationId xmlns:p14="http://schemas.microsoft.com/office/powerpoint/2010/main" val="714179036"/>
+      </p:ext>
+    </p:extLst>
+  </p:cSld>
+  <p:clrMapOvr>
+    <a:masterClrMapping/>
+  </p:clrMapOvr>
+  <p:timing>
+    <p:tnLst>
+      <p:par>
+        <p:cTn id="1" dur="indefinite" restart="never" nodeType="tmRoot"/>
+      </p:par>
+    </p:tnLst>
+  </p:timing>
+</p:sld>
+</file>
+
+<file path=ppt/slides/slide13.xml><?xml version="1.0" encoding="utf-8"?>
+<p:sld xmlns:a="http://schemas.openxmlformats.org/drawingml/2006/main" xmlns:r="http://schemas.openxmlformats.org/officeDocument/2006/relationships" xmlns:p="http://schemas.openxmlformats.org/presentationml/2006/main">
+  <p:cSld>
+    <p:spTree>
+      <p:nvGrpSpPr>
+        <p:cNvPr id="1" name=""/>
+        <p:cNvGrpSpPr/>
+        <p:nvPr/>
+      </p:nvGrpSpPr>
+      <p:grpSpPr>
+        <a:xfrm>
+          <a:off x="0" y="0"/>
+          <a:ext cx="0" cy="0"/>
+          <a:chOff x="0" y="0"/>
+          <a:chExt cx="0" cy="0"/>
+        </a:xfrm>
+      </p:grpSpPr>
+      <p:sp>
+        <p:nvSpPr>
+          <p:cNvPr id="2" name="Title 1"/>
+          <p:cNvSpPr>
+            <a:spLocks noGrp="1"/>
+          </p:cNvSpPr>
+          <p:nvPr>
+            <p:ph type="title"/>
+          </p:nvPr>
+        </p:nvSpPr>
+        <p:spPr/>
+        <p:txBody>
+          <a:bodyPr/>
+          <a:lstStyle/>
+          <a:p>
+            <a:r>
+              <a:rPr lang="en-US" dirty="0" smtClean="0"/>
+              <a:t>Design Activity</a:t>
+            </a:r>
+            <a:endParaRPr lang="en-US" dirty="0"/>
+          </a:p>
+        </p:txBody>
+      </p:sp>
+      <p:sp>
+        <p:nvSpPr>
+          <p:cNvPr id="3" name="Content Placeholder 2"/>
+          <p:cNvSpPr>
+            <a:spLocks noGrp="1"/>
+          </p:cNvSpPr>
+          <p:nvPr>
+            <p:ph idx="1"/>
+          </p:nvPr>
+        </p:nvSpPr>
+        <p:spPr/>
+        <p:txBody>
+          <a:bodyPr/>
+          <a:lstStyle/>
+          <a:p>
+            <a:r>
+              <a:rPr lang="en-US" dirty="0" smtClean="0"/>
+              <a:t>Hand out </a:t>
+            </a:r>
+            <a:endParaRPr lang="en-US" dirty="0"/>
+          </a:p>
+        </p:txBody>
+      </p:sp>
+    </p:spTree>
+    <p:extLst>
+      <p:ext uri="{BB962C8B-B14F-4D97-AF65-F5344CB8AC3E}">
+        <p14:creationId xmlns:p14="http://schemas.microsoft.com/office/powerpoint/2010/main" val="3038993397"/>
+      </p:ext>
+    </p:extLst>
+  </p:cSld>
+  <p:clrMapOvr>
+    <a:masterClrMapping/>
+  </p:clrMapOvr>
+  <p:timing>
+    <p:tnLst>
+      <p:par>
+        <p:cTn id="1" dur="indefinite" restart="never" nodeType="tmRoot"/>
+      </p:par>
+    </p:tnLst>
+  </p:timing>
+</p:sld>
+</file>
+
+<file path=ppt/slides/slide14.xml><?xml version="1.0" encoding="utf-8"?>
+<p:sld xmlns:a="http://schemas.openxmlformats.org/drawingml/2006/main" xmlns:r="http://schemas.openxmlformats.org/officeDocument/2006/relationships" xmlns:p="http://schemas.openxmlformats.org/presentationml/2006/main">
+  <p:cSld>
+    <p:spTree>
+      <p:nvGrpSpPr>
+        <p:cNvPr id="1" name=""/>
+        <p:cNvGrpSpPr/>
+        <p:nvPr/>
+      </p:nvGrpSpPr>
+      <p:grpSpPr>
+        <a:xfrm>
+          <a:off x="0" y="0"/>
+          <a:ext cx="0" cy="0"/>
+          <a:chOff x="0" y="0"/>
+          <a:chExt cx="0" cy="0"/>
+        </a:xfrm>
+      </p:grpSpPr>
+      <p:sp>
+        <p:nvSpPr>
+          <p:cNvPr id="3" name="Content Placeholder 2"/>
+          <p:cNvSpPr>
+            <a:spLocks noGrp="1"/>
+          </p:cNvSpPr>
+          <p:nvPr>
+            <p:ph idx="1"/>
+          </p:nvPr>
+        </p:nvSpPr>
+        <p:spPr>
+          <a:xfrm>
+            <a:off x="152400" y="533400"/>
+            <a:ext cx="8686800" cy="2133600"/>
+          </a:xfrm>
+        </p:spPr>
+        <p:txBody>
+          <a:bodyPr>
+            <a:normAutofit fontScale="85000" lnSpcReduction="20000"/>
+          </a:bodyPr>
+          <a:lstStyle/>
+          <a:p>
+            <a:pPr marL="0" indent="0">
+              <a:buNone/>
+            </a:pPr>
+            <a:r>
+              <a:rPr lang="en-US" dirty="0" smtClean="0"/>
+              <a:t>In </a:t>
+            </a:r>
+            <a:r>
+              <a:rPr lang="en-US" dirty="0"/>
+              <a:t>the </a:t>
+            </a:r>
+            <a:r>
+              <a:rPr lang="en-US" dirty="0" smtClean="0"/>
+              <a:t>game </a:t>
+            </a:r>
+            <a:r>
+              <a:rPr lang="en-US" dirty="0" err="1"/>
+              <a:t>Bomberman</a:t>
+            </a:r>
+            <a:r>
+              <a:rPr lang="en-US" dirty="0"/>
+              <a:t>, everything has special behavior if caught in a bomb explosion.  </a:t>
+            </a:r>
+            <a:r>
+              <a:rPr lang="en-US" dirty="0" smtClean="0"/>
+              <a:t>Heroes </a:t>
+            </a:r>
+            <a:r>
+              <a:rPr lang="en-US" dirty="0"/>
+              <a:t>die and restart the level, monsters are killed and score points, walls are destroyed, and bombs explode themselves.  In the design below, the Bomb class has an </a:t>
+            </a:r>
+            <a:r>
+              <a:rPr lang="en-US" dirty="0" err="1"/>
+              <a:t>onExplosion</a:t>
+            </a:r>
+            <a:r>
+              <a:rPr lang="en-US" dirty="0"/>
+              <a:t> method which handles this behavior and (you can assume) works correctly</a:t>
+            </a:r>
+            <a:r>
+              <a:rPr lang="en-US" dirty="0" smtClean="0"/>
+              <a:t>.</a:t>
+            </a:r>
+            <a:endParaRPr lang="en-US" dirty="0"/>
+          </a:p>
+        </p:txBody>
+      </p:sp>
+      <p:pic>
+        <p:nvPicPr>
+          <p:cNvPr id="2" name="Picture 1"/>
+          <p:cNvPicPr>
+            <a:picLocks noChangeAspect="1"/>
+          </p:cNvPicPr>
+          <p:nvPr/>
+        </p:nvPicPr>
+        <p:blipFill>
+          <a:blip r:embed="rId2"/>
+          <a:stretch>
+            <a:fillRect/>
+          </a:stretch>
+        </p:blipFill>
+        <p:spPr>
+          <a:xfrm>
+            <a:off x="533400" y="2667000"/>
+            <a:ext cx="8153400" cy="4072274"/>
+          </a:xfrm>
+          <a:prstGeom prst="rect">
+            <a:avLst/>
+          </a:prstGeom>
+        </p:spPr>
+      </p:pic>
+    </p:spTree>
+    <p:extLst>
+      <p:ext uri="{BB962C8B-B14F-4D97-AF65-F5344CB8AC3E}">
+        <p14:creationId xmlns:p14="http://schemas.microsoft.com/office/powerpoint/2010/main" val="862967812"/>
+      </p:ext>
+    </p:extLst>
+  </p:cSld>
+  <p:clrMapOvr>
+    <a:masterClrMapping/>
+  </p:clrMapOvr>
+  <p:timing>
+    <p:tnLst>
+      <p:par>
+        <p:cTn id="1" dur="indefinite" restart="never" nodeType="tmRoot"/>
+      </p:par>
+    </p:tnLst>
+  </p:timing>
+</p:sld>
+</file>
+
+<file path=ppt/slides/slide15.xml><?xml version="1.0" encoding="utf-8"?>
+<p:sld xmlns:a="http://schemas.openxmlformats.org/drawingml/2006/main" xmlns:r="http://schemas.openxmlformats.org/officeDocument/2006/relationships" xmlns:p="http://schemas.openxmlformats.org/presentationml/2006/main">
+  <p:cSld>
+    <p:spTree>
+      <p:nvGrpSpPr>
+        <p:cNvPr id="1" name=""/>
+        <p:cNvGrpSpPr/>
+        <p:nvPr/>
+      </p:nvGrpSpPr>
+      <p:grpSpPr>
+        <a:xfrm>
+          <a:off x="0" y="0"/>
+          <a:ext cx="0" cy="0"/>
+          <a:chOff x="0" y="0"/>
+          <a:chExt cx="0" cy="0"/>
+        </a:xfrm>
+      </p:grpSpPr>
+      <p:sp>
+        <p:nvSpPr>
+          <p:cNvPr id="2" name="Title 1"/>
+          <p:cNvSpPr>
+            <a:spLocks noGrp="1"/>
+          </p:cNvSpPr>
+          <p:nvPr>
+            <p:ph type="title"/>
+          </p:nvPr>
+        </p:nvSpPr>
+        <p:spPr/>
+        <p:txBody>
+          <a:bodyPr/>
+          <a:lstStyle/>
+          <a:p>
+            <a:r>
+              <a:rPr lang="en-US" dirty="0" smtClean="0"/>
+              <a:t>Collision Code</a:t>
+            </a:r>
+            <a:endParaRPr lang="en-US" dirty="0"/>
+          </a:p>
+        </p:txBody>
+      </p:sp>
+      <p:sp>
+        <p:nvSpPr>
+          <p:cNvPr id="3" name="Content Placeholder 2"/>
+          <p:cNvSpPr>
+            <a:spLocks noGrp="1"/>
+          </p:cNvSpPr>
+          <p:nvPr>
+            <p:ph idx="1"/>
+          </p:nvPr>
+        </p:nvSpPr>
+        <p:spPr>
+          <a:xfrm>
+            <a:off x="457200" y="1177410"/>
+            <a:ext cx="8229600" cy="4525963"/>
+          </a:xfrm>
+        </p:spPr>
+        <p:txBody>
+          <a:bodyPr>
+            <a:normAutofit fontScale="85000" lnSpcReduction="20000"/>
+          </a:bodyPr>
+          <a:lstStyle/>
+          <a:p>
+            <a:pPr marL="0" indent="0">
+              <a:buNone/>
+            </a:pPr>
+            <a:r>
+              <a:rPr lang="en-US" dirty="0"/>
+              <a:t>for(</a:t>
+            </a:r>
+            <a:r>
+              <a:rPr lang="en-US" dirty="0" err="1"/>
+              <a:t>GameObject</a:t>
+            </a:r>
+            <a:r>
+              <a:rPr lang="en-US" dirty="0"/>
+              <a:t> g : </a:t>
+            </a:r>
+            <a:r>
+              <a:rPr lang="en-US" dirty="0" err="1"/>
+              <a:t>getObjectsWithinBombExplosion</a:t>
+            </a:r>
+            <a:r>
+              <a:rPr lang="en-US" dirty="0"/>
+              <a:t>()) {</a:t>
+            </a:r>
+          </a:p>
+          <a:p>
+            <a:pPr marL="0" indent="0">
+              <a:buNone/>
+            </a:pPr>
+            <a:r>
+              <a:rPr lang="en-US" dirty="0"/>
+              <a:t/>
+            </a:r>
+            <a:br>
+              <a:rPr lang="en-US" dirty="0"/>
+            </a:br>
+            <a:r>
+              <a:rPr lang="en-US" dirty="0"/>
+              <a:t>if(g </a:t>
+            </a:r>
+            <a:r>
+              <a:rPr lang="en-US" dirty="0" err="1"/>
+              <a:t>instanceof</a:t>
+            </a:r>
+            <a:r>
+              <a:rPr lang="en-US" dirty="0"/>
+              <a:t> Bomb) {</a:t>
+            </a:r>
+          </a:p>
+          <a:p>
+            <a:pPr marL="0" indent="0">
+              <a:buNone/>
+            </a:pPr>
+            <a:r>
+              <a:rPr lang="en-US" dirty="0"/>
+              <a:t>    // bomb specific code</a:t>
+            </a:r>
+          </a:p>
+          <a:p>
+            <a:pPr marL="0" indent="0">
+              <a:buNone/>
+            </a:pPr>
+            <a:r>
+              <a:rPr lang="en-US" dirty="0"/>
+              <a:t>}</a:t>
+            </a:r>
+          </a:p>
+          <a:p>
+            <a:pPr marL="0" indent="0">
+              <a:buNone/>
+            </a:pPr>
+            <a:r>
+              <a:rPr lang="en-US" dirty="0"/>
+              <a:t>if(g </a:t>
+            </a:r>
+            <a:r>
+              <a:rPr lang="en-US" dirty="0" err="1"/>
+              <a:t>instanceof</a:t>
+            </a:r>
+            <a:r>
+              <a:rPr lang="en-US" dirty="0"/>
+              <a:t> Wall) {</a:t>
+            </a:r>
+          </a:p>
+          <a:p>
+            <a:pPr marL="0" indent="0">
+              <a:buNone/>
+            </a:pPr>
+            <a:r>
+              <a:rPr lang="en-US" dirty="0"/>
+              <a:t>    //wall specific code</a:t>
+            </a:r>
+          </a:p>
+          <a:p>
+            <a:pPr marL="0" indent="0">
+              <a:buNone/>
+            </a:pPr>
+            <a:r>
+              <a:rPr lang="en-US" dirty="0"/>
+              <a:t>}</a:t>
+            </a:r>
+          </a:p>
+          <a:p>
+            <a:pPr marL="0" indent="0">
+              <a:buNone/>
+            </a:pPr>
+            <a:r>
+              <a:rPr lang="en-US" dirty="0"/>
+              <a:t>//pattern continues...</a:t>
+            </a:r>
+          </a:p>
+          <a:p>
+            <a:pPr marL="0" indent="0">
+              <a:buNone/>
+            </a:pPr>
+            <a:r>
+              <a:rPr lang="en-US" dirty="0" smtClean="0"/>
+              <a:t>}</a:t>
+            </a:r>
+            <a:r>
+              <a:rPr lang="en-US" dirty="0"/>
+              <a:t/>
+            </a:r>
+            <a:br>
+              <a:rPr lang="en-US" dirty="0"/>
+            </a:br>
+            <a:endParaRPr lang="en-US" dirty="0"/>
+          </a:p>
+        </p:txBody>
+      </p:sp>
+      <p:sp>
+        <p:nvSpPr>
+          <p:cNvPr id="5" name="TextBox 4"/>
+          <p:cNvSpPr txBox="1"/>
+          <p:nvPr/>
+        </p:nvSpPr>
+        <p:spPr>
+          <a:xfrm>
+            <a:off x="457200" y="5317436"/>
+            <a:ext cx="8458200" cy="1754326"/>
+          </a:xfrm>
+          <a:prstGeom prst="rect">
+            <a:avLst/>
+          </a:prstGeom>
+          <a:noFill/>
+        </p:spPr>
+        <p:txBody>
+          <a:bodyPr wrap="square" rtlCol="0">
+            <a:spAutoFit/>
+          </a:bodyPr>
+          <a:lstStyle/>
+          <a:p>
+            <a:r>
+              <a:rPr lang="en-US" dirty="0" smtClean="0"/>
+              <a:t>1</a:t>
+            </a:r>
+            <a:r>
+              <a:rPr lang="en-US" dirty="0"/>
+              <a:t>. What is wrong with the design?</a:t>
+            </a:r>
+          </a:p>
+          <a:p>
+            <a:r>
+              <a:rPr lang="en-US" dirty="0"/>
+              <a:t>2. Propose a new design that does not have the problem you identified in #1.  You only need include in your UML diagram classes that are *different* from their version in the given diagram</a:t>
+            </a:r>
+            <a:r>
+              <a:rPr lang="en-US" dirty="0" smtClean="0"/>
+              <a:t>.</a:t>
+            </a:r>
+            <a:r>
+              <a:rPr lang="en-US" dirty="0"/>
+              <a:t/>
+            </a:r>
+            <a:br>
+              <a:rPr lang="en-US" dirty="0"/>
+            </a:br>
+            <a:r>
+              <a:rPr lang="en-US" dirty="0"/>
+              <a:t>Also include a sample for what the analogous code on </a:t>
+            </a:r>
+            <a:r>
+              <a:rPr lang="en-US" dirty="0" err="1"/>
+              <a:t>onExplosion</a:t>
+            </a:r>
+            <a:r>
+              <a:rPr lang="en-US" dirty="0"/>
+              <a:t> looks like</a:t>
+            </a:r>
+            <a:endParaRPr lang="en-US" dirty="0" smtClean="0"/>
+          </a:p>
+          <a:p>
+            <a:endParaRPr lang="en-US" dirty="0"/>
+          </a:p>
+        </p:txBody>
+      </p:sp>
+      <p:pic>
+        <p:nvPicPr>
+          <p:cNvPr id="6" name="Picture 5"/>
+          <p:cNvPicPr>
+            <a:picLocks noChangeAspect="1"/>
+          </p:cNvPicPr>
+          <p:nvPr/>
+        </p:nvPicPr>
+        <p:blipFill>
+          <a:blip r:embed="rId3"/>
+          <a:stretch>
+            <a:fillRect/>
+          </a:stretch>
+        </p:blipFill>
+        <p:spPr>
+          <a:xfrm>
+            <a:off x="3845457" y="2590800"/>
+            <a:ext cx="5149091" cy="2571750"/>
+          </a:xfrm>
+          <a:prstGeom prst="rect">
+            <a:avLst/>
+          </a:prstGeom>
+        </p:spPr>
+      </p:pic>
+    </p:spTree>
+    <p:extLst>
+      <p:ext uri="{BB962C8B-B14F-4D97-AF65-F5344CB8AC3E}">
+        <p14:creationId xmlns:p14="http://schemas.microsoft.com/office/powerpoint/2010/main" val="2717704157"/>
+      </p:ext>
+    </p:extLst>
+  </p:cSld>
+  <p:clrMapOvr>
+    <a:masterClrMapping/>
+  </p:clrMapOvr>
+  <p:timing>
+    <p:tnLst>
+      <p:par>
+        <p:cTn id="1" dur="indefinite" restart="never" nodeType="tmRoot"/>
+      </p:par>
+    </p:tnLst>
+  </p:timing>
+</p:sld>
+</file>
+
+<file path=ppt/slides/slide16.xml><?xml version="1.0" encoding="utf-8"?>
+<p:sld xmlns:a="http://schemas.openxmlformats.org/drawingml/2006/main" xmlns:r="http://schemas.openxmlformats.org/officeDocument/2006/relationships" xmlns:p="http://schemas.openxmlformats.org/presentationml/2006/main">
+  <p:cSld>
+    <p:spTree>
+      <p:nvGrpSpPr>
+        <p:cNvPr id="1" name=""/>
+        <p:cNvGrpSpPr/>
+        <p:nvPr/>
+      </p:nvGrpSpPr>
+      <p:grpSpPr>
+        <a:xfrm>
+          <a:off x="0" y="0"/>
+          <a:ext cx="0" cy="0"/>
+          <a:chOff x="0" y="0"/>
+          <a:chExt cx="0" cy="0"/>
+        </a:xfrm>
+      </p:grpSpPr>
+      <p:sp>
+        <p:nvSpPr>
+          <p:cNvPr id="2" name="Title 1"/>
+          <p:cNvSpPr>
+            <a:spLocks noGrp="1"/>
+          </p:cNvSpPr>
+          <p:nvPr>
+            <p:ph type="title"/>
+          </p:nvPr>
+        </p:nvSpPr>
+        <p:spPr/>
+        <p:txBody>
+          <a:bodyPr/>
+          <a:lstStyle/>
+          <a:p>
+            <a:r>
+              <a:rPr lang="en-US" dirty="0" smtClean="0"/>
+              <a:t>A Solution</a:t>
+            </a:r>
+            <a:endParaRPr lang="en-US" dirty="0"/>
+          </a:p>
+        </p:txBody>
+      </p:sp>
+      <p:sp>
+        <p:nvSpPr>
+          <p:cNvPr id="3" name="Content Placeholder 2"/>
+          <p:cNvSpPr>
+            <a:spLocks noGrp="1"/>
+          </p:cNvSpPr>
+          <p:nvPr>
+            <p:ph idx="1"/>
+          </p:nvPr>
+        </p:nvSpPr>
+        <p:spPr/>
+        <p:txBody>
+          <a:bodyPr/>
+          <a:lstStyle/>
+          <a:p>
+            <a:endParaRPr lang="en-US"/>
+          </a:p>
+        </p:txBody>
+      </p:sp>
+      <p:pic>
+        <p:nvPicPr>
+          <p:cNvPr id="4" name="Picture 3"/>
+          <p:cNvPicPr>
+            <a:picLocks noChangeAspect="1"/>
+          </p:cNvPicPr>
+          <p:nvPr/>
+        </p:nvPicPr>
+        <p:blipFill>
+          <a:blip r:embed="rId2"/>
+          <a:stretch>
+            <a:fillRect/>
+          </a:stretch>
+        </p:blipFill>
+        <p:spPr>
+          <a:xfrm>
+            <a:off x="403905" y="1506538"/>
+            <a:ext cx="8372475" cy="4619625"/>
+          </a:xfrm>
+          <a:prstGeom prst="rect">
+            <a:avLst/>
+          </a:prstGeom>
+        </p:spPr>
+      </p:pic>
+    </p:spTree>
+    <p:extLst>
+      <p:ext uri="{BB962C8B-B14F-4D97-AF65-F5344CB8AC3E}">
+        <p14:creationId xmlns:p14="http://schemas.microsoft.com/office/powerpoint/2010/main" val="2927449891"/>
+      </p:ext>
+    </p:extLst>
+  </p:cSld>
+  <p:clrMapOvr>
+    <a:masterClrMapping/>
+  </p:clrMapOvr>
+  <mc:AlternateContent xmlns:mc="http://schemas.openxmlformats.org/markup-compatibility/2006">
+    <mc:Choice xmlns:p14="http://schemas.microsoft.com/office/powerpoint/2010/main" Requires="p14">
+      <p:transition spd="slow" p14:dur="2000"/>
+    </mc:Choice>
+    <mc:Fallback>
+      <p:transition spd="slow"/>
+    </mc:Fallback>
+  </mc:AlternateContent>
+  <p:timing>
+    <p:tnLst>
+      <p:par>
+        <p:cTn id="1" dur="indefinite" restart="never" nodeType="tmRoot"/>
+      </p:par>
+    </p:tnLst>
+  </p:timing>
+</p:sld>
+</file>
+
+<file path=ppt/slides/slide17.xml><?xml version="1.0" encoding="utf-8"?>
+<p:sld xmlns:a="http://schemas.openxmlformats.org/drawingml/2006/main" xmlns:r="http://schemas.openxmlformats.org/officeDocument/2006/relationships" xmlns:p="http://schemas.openxmlformats.org/presentationml/2006/main">
+  <p:cSld>
+    <p:spTree>
+      <p:nvGrpSpPr>
+        <p:cNvPr id="1" name=""/>
+        <p:cNvGrpSpPr/>
+        <p:nvPr/>
+      </p:nvGrpSpPr>
+      <p:grpSpPr>
+        <a:xfrm>
+          <a:off x="0" y="0"/>
+          <a:ext cx="0" cy="0"/>
+          <a:chOff x="0" y="0"/>
+          <a:chExt cx="0" cy="0"/>
+        </a:xfrm>
+      </p:grpSpPr>
+      <p:sp>
+        <p:nvSpPr>
+          <p:cNvPr id="3" name="Content Placeholder 2"/>
+          <p:cNvSpPr>
+            <a:spLocks noGrp="1"/>
+          </p:cNvSpPr>
+          <p:nvPr>
+            <p:ph idx="1"/>
+          </p:nvPr>
+        </p:nvSpPr>
+        <p:spPr>
+          <a:xfrm>
+            <a:off x="457200" y="4313237"/>
+            <a:ext cx="8229600" cy="2544763"/>
+          </a:xfrm>
+        </p:spPr>
+        <p:txBody>
+          <a:bodyPr>
+            <a:normAutofit fontScale="55000" lnSpcReduction="20000"/>
+          </a:bodyPr>
+          <a:lstStyle/>
+          <a:p>
+            <a:pPr marL="0" indent="0">
+              <a:buNone/>
+            </a:pPr>
+            <a:r>
+              <a:rPr lang="en-US" dirty="0"/>
+              <a:t>Each subclass will process the effects of a collision inside of the </a:t>
+            </a:r>
+            <a:r>
+              <a:rPr lang="en-US" dirty="0" err="1"/>
+              <a:t>collideWithExplodingBomb</a:t>
+            </a:r>
+            <a:r>
+              <a:rPr lang="en-US" dirty="0"/>
+              <a:t> method. No </a:t>
+            </a:r>
+            <a:r>
+              <a:rPr lang="en-US" dirty="0" err="1"/>
+              <a:t>instanceof</a:t>
+            </a:r>
+            <a:r>
+              <a:rPr lang="en-US" dirty="0"/>
+              <a:t> is required. Additionally, the code to handle collisions can be </a:t>
+            </a:r>
+            <a:r>
+              <a:rPr lang="en-US" dirty="0" smtClean="0"/>
+              <a:t>done inside </a:t>
+            </a:r>
+            <a:r>
+              <a:rPr lang="en-US" dirty="0" err="1" smtClean="0"/>
+              <a:t>onExplosion</a:t>
+            </a:r>
+            <a:r>
+              <a:rPr lang="en-US" dirty="0" smtClean="0"/>
+              <a:t> as before:</a:t>
+            </a:r>
+            <a:endParaRPr lang="en-US" dirty="0"/>
+          </a:p>
+          <a:p>
+            <a:pPr marL="0" indent="0">
+              <a:buNone/>
+            </a:pPr>
+            <a:r>
+              <a:rPr lang="en-US" dirty="0"/>
+              <a:t/>
+            </a:r>
+            <a:br>
+              <a:rPr lang="en-US" dirty="0"/>
+            </a:br>
+            <a:r>
+              <a:rPr lang="en-US" dirty="0" smtClean="0"/>
+              <a:t>for(</a:t>
+            </a:r>
+            <a:r>
+              <a:rPr lang="en-US" dirty="0" err="1" smtClean="0"/>
+              <a:t>GameObject</a:t>
+            </a:r>
+            <a:r>
+              <a:rPr lang="en-US" dirty="0" smtClean="0"/>
+              <a:t> </a:t>
+            </a:r>
+            <a:r>
+              <a:rPr lang="en-US" dirty="0"/>
+              <a:t>g : </a:t>
+            </a:r>
+            <a:r>
+              <a:rPr lang="en-US" dirty="0" err="1"/>
+              <a:t>getObjectsWithinBombExplosion</a:t>
+            </a:r>
+            <a:r>
+              <a:rPr lang="en-US" dirty="0"/>
+              <a:t>()) {</a:t>
+            </a:r>
+          </a:p>
+          <a:p>
+            <a:pPr marL="0" indent="0">
+              <a:buNone/>
+            </a:pPr>
+            <a:r>
+              <a:rPr lang="en-US" dirty="0" smtClean="0"/>
+              <a:t>	</a:t>
+            </a:r>
+            <a:r>
+              <a:rPr lang="en-US" dirty="0" err="1" smtClean="0"/>
+              <a:t>g.collideWithExplodingBomb</a:t>
+            </a:r>
+            <a:r>
+              <a:rPr lang="en-US" dirty="0" smtClean="0"/>
+              <a:t>(this</a:t>
+            </a:r>
+            <a:r>
+              <a:rPr lang="en-US" dirty="0"/>
+              <a:t>);</a:t>
+            </a:r>
+          </a:p>
+          <a:p>
+            <a:pPr marL="0" indent="0">
+              <a:buNone/>
+            </a:pPr>
+            <a:r>
+              <a:rPr lang="en-US" dirty="0"/>
+              <a:t>}</a:t>
+            </a:r>
+          </a:p>
+          <a:p>
+            <a:pPr marL="0" indent="0">
+              <a:buNone/>
+            </a:pPr>
+            <a:r>
+              <a:rPr lang="en-US" dirty="0"/>
+              <a:t/>
+            </a:r>
+            <a:br>
+              <a:rPr lang="en-US" dirty="0"/>
+            </a:br>
+            <a:r>
+              <a:rPr lang="en-US" dirty="0"/>
+              <a:t>Each subclass will deal with handling the class specific effects of being hit by a </a:t>
+            </a:r>
+            <a:r>
+              <a:rPr lang="en-US" dirty="0" smtClean="0"/>
+              <a:t>bomb</a:t>
+            </a:r>
+            <a:endParaRPr lang="en-US" dirty="0"/>
+          </a:p>
+        </p:txBody>
+      </p:sp>
+      <p:pic>
+        <p:nvPicPr>
+          <p:cNvPr id="4" name="Picture 3"/>
+          <p:cNvPicPr>
+            <a:picLocks noChangeAspect="1"/>
+          </p:cNvPicPr>
+          <p:nvPr/>
+        </p:nvPicPr>
+        <p:blipFill>
+          <a:blip r:embed="rId2"/>
+          <a:stretch>
+            <a:fillRect/>
+          </a:stretch>
+        </p:blipFill>
+        <p:spPr>
+          <a:xfrm>
+            <a:off x="1143000" y="274638"/>
+            <a:ext cx="6553200" cy="3615816"/>
+          </a:xfrm>
+          <a:prstGeom prst="rect">
+            <a:avLst/>
+          </a:prstGeom>
+        </p:spPr>
+      </p:pic>
+    </p:spTree>
+    <p:extLst>
+      <p:ext uri="{BB962C8B-B14F-4D97-AF65-F5344CB8AC3E}">
+        <p14:creationId xmlns:p14="http://schemas.microsoft.com/office/powerpoint/2010/main" val="2739635398"/>
+      </p:ext>
+    </p:extLst>
+  </p:cSld>
+  <p:clrMapOvr>
+    <a:masterClrMapping/>
+  </p:clrMapOvr>
+  <mc:AlternateContent xmlns:mc="http://schemas.openxmlformats.org/markup-compatibility/2006">
+    <mc:Choice xmlns:p14="http://schemas.microsoft.com/office/powerpoint/2010/main" Requires="p14">
+      <p:transition spd="slow" p14:dur="2000"/>
+    </mc:Choice>
+    <mc:Fallback>
+      <p:transition spd="slow"/>
+    </mc:Fallback>
+  </mc:AlternateContent>
+  <p:timing>
+    <p:tnLst>
+      <p:par>
+        <p:cTn id="1" dur="indefinite" restart="never" nodeType="tmRoot"/>
+      </p:par>
+    </p:tnLst>
+  </p:timing>
+</p:sld>
+</file>
+
+<file path=ppt/slides/slide18.xml><?xml version="1.0" encoding="utf-8"?>
+<p:sld xmlns:a="http://schemas.openxmlformats.org/drawingml/2006/main" xmlns:r="http://schemas.openxmlformats.org/officeDocument/2006/relationships" xmlns:p="http://schemas.openxmlformats.org/presentationml/2006/main">
+  <p:cSld>
+    <p:spTree>
+      <p:nvGrpSpPr>
+        <p:cNvPr id="1" name=""/>
+        <p:cNvGrpSpPr/>
+        <p:nvPr/>
+      </p:nvGrpSpPr>
+      <p:grpSpPr>
+        <a:xfrm>
+          <a:off x="0" y="0"/>
+          <a:ext cx="0" cy="0"/>
+          <a:chOff x="0" y="0"/>
+          <a:chExt cx="0" cy="0"/>
+        </a:xfrm>
+      </p:grpSpPr>
+      <p:sp>
+        <p:nvSpPr>
+          <p:cNvPr id="4" name="Title 3"/>
+          <p:cNvSpPr>
+            <a:spLocks noGrp="1"/>
+          </p:cNvSpPr>
+          <p:nvPr>
+            <p:ph type="title"/>
+          </p:nvPr>
+        </p:nvSpPr>
+        <p:spPr/>
+        <p:txBody>
+          <a:bodyPr/>
+          <a:lstStyle/>
+          <a:p>
+            <a:pPr>
+              <a:defRPr/>
+            </a:pPr>
+            <a:r>
+              <a:rPr lang="en-US" dirty="0" smtClean="0">
+                <a:ea typeface="+mj-ea"/>
+                <a:cs typeface="+mj-cs"/>
+              </a:rPr>
+              <a:t>Team Project</a:t>
+            </a:r>
+            <a:endParaRPr lang="en-US" dirty="0">
+              <a:ea typeface="+mj-ea"/>
+              <a:cs typeface="+mj-cs"/>
+            </a:endParaRPr>
+          </a:p>
+        </p:txBody>
+      </p:sp>
+      <p:sp>
+        <p:nvSpPr>
+          <p:cNvPr id="29699" name="Text Placeholder 4"/>
+          <p:cNvSpPr>
+            <a:spLocks noGrp="1"/>
+          </p:cNvSpPr>
+          <p:nvPr>
+            <p:ph type="body" idx="1"/>
+          </p:nvPr>
+        </p:nvSpPr>
+        <p:spPr/>
+        <p:txBody>
+          <a:bodyPr/>
+          <a:lstStyle/>
+          <a:p>
+            <a:r>
+              <a:rPr lang="en-US" dirty="0" smtClean="0"/>
+              <a:t>Work time</a:t>
+            </a:r>
+          </a:p>
+          <a:p>
+            <a:r>
+              <a:rPr lang="en-US" i="1" dirty="0" smtClean="0"/>
+              <a:t>Be sure everyone is getting a chance to drive.</a:t>
+            </a:r>
+          </a:p>
+        </p:txBody>
+      </p:sp>
+    </p:spTree>
+    <p:extLst>
+      <p:ext uri="{BB962C8B-B14F-4D97-AF65-F5344CB8AC3E}">
+        <p14:creationId xmlns:p14="http://schemas.microsoft.com/office/powerpoint/2010/main" val="2413903598"/>
+      </p:ext>
+    </p:extLst>
+  </p:cSld>
+  <p:clrMapOvr>
+    <a:masterClrMapping/>
+  </p:clrMapOvr>
+  <p:transition/>
+  <p:timing>
+    <p:tnLst>
+      <p:par>
+        <p:cTn id="1" dur="indefinite" restart="never" nodeType="tmRoot"/>
+      </p:par>
+    </p:tnLst>
+  </p:timing>
 </p:sld>
 </file>
 
@@ -6565,7 +6623,7 @@
         </p:nvSpPr>
         <p:spPr>
           <a:xfrm>
-            <a:off x="152400" y="1242218"/>
+            <a:off x="152400" y="1600200"/>
             <a:ext cx="8534400" cy="4525963"/>
           </a:xfrm>
         </p:spPr>
@@ -6574,48 +6632,9 @@
           <a:lstStyle/>
           <a:p>
             <a:r>
-              <a:rPr lang="en-US" dirty="0" err="1" smtClean="0"/>
-              <a:t>AbstractPlatform</a:t>
-            </a:r>
-            <a:r>
               <a:rPr lang="en-US" dirty="0" smtClean="0"/>
-              <a:t> and  </a:t>
-            </a:r>
-            <a:r>
-              <a:rPr lang="en-US" dirty="0" err="1" smtClean="0"/>
-              <a:t>AbstractDrop</a:t>
-            </a:r>
-            <a:endParaRPr lang="en-US" dirty="0" smtClean="0"/>
-          </a:p>
-          <a:p>
-            <a:pPr lvl="1"/>
-            <a:r>
-              <a:rPr lang="en-US" dirty="0" smtClean="0"/>
-              <a:t>Subclasses implement </a:t>
-            </a:r>
-          </a:p>
-          <a:p>
-            <a:pPr lvl="1"/>
-            <a:r>
-              <a:rPr lang="en-US" dirty="0" err="1" smtClean="0"/>
-              <a:t>collideWith</a:t>
-            </a:r>
-            <a:r>
-              <a:rPr lang="en-US" dirty="0" smtClean="0"/>
-              <a:t>(</a:t>
-            </a:r>
-            <a:r>
-              <a:rPr lang="en-US" dirty="0" err="1" smtClean="0"/>
-              <a:t>AbstractPlatform</a:t>
-            </a:r>
-            <a:r>
-              <a:rPr lang="en-US" dirty="0" smtClean="0"/>
-              <a:t>)</a:t>
-            </a:r>
-            <a:endParaRPr lang="en-US" dirty="0"/>
-          </a:p>
-          <a:p>
-            <a:pPr lvl="1"/>
+              <a:t>What if we wanted Platforms to collide as well?</a:t>
+            </a:r>
             <a:endParaRPr lang="en-US" dirty="0"/>
           </a:p>
         </p:txBody>
@@ -6629,7 +6648,7 @@
           <p:nvPr>
             <p:extLst>
               <p:ext uri="{D42A27DB-BD31-4B8C-83A1-F6EECF244321}">
-                <p14:modId xmlns:p14="http://schemas.microsoft.com/office/powerpoint/2010/main" val="3577914708"/>
+                <p14:modId xmlns:p14="http://schemas.microsoft.com/office/powerpoint/2010/main" val="4284010156"/>
               </p:ext>
             </p:extLst>
           </p:nvPr>
@@ -7049,13 +7068,20 @@
     </p:spTree>
     <p:extLst>
       <p:ext uri="{BB962C8B-B14F-4D97-AF65-F5344CB8AC3E}">
-        <p14:creationId xmlns:p14="http://schemas.microsoft.com/office/powerpoint/2010/main" val="1951997951"/>
+        <p14:creationId xmlns:p14="http://schemas.microsoft.com/office/powerpoint/2010/main" val="3617275525"/>
       </p:ext>
     </p:extLst>
   </p:cSld>
   <p:clrMapOvr>
     <a:masterClrMapping/>
   </p:clrMapOvr>
+  <p:timing>
+    <p:tnLst>
+      <p:par>
+        <p:cTn id="1" dur="indefinite" restart="never" nodeType="tmRoot"/>
+      </p:par>
+    </p:tnLst>
+  </p:timing>
 </p:sld>
 </file>
 
@@ -7118,31 +7144,22 @@
           <a:p>
             <a:r>
               <a:rPr lang="en-US" dirty="0" smtClean="0"/>
-              <a:t>Monsters can collide with rocks.</a:t>
-            </a:r>
-          </a:p>
-          <a:p>
+              <a:t>Monsters can collide with </a:t>
+            </a:r>
             <a:r>
               <a:rPr lang="en-US" dirty="0" smtClean="0"/>
-              <a:t>Rocks can crush monsters.</a:t>
-            </a:r>
+              <a:t>the Player.</a:t>
+            </a:r>
+            <a:endParaRPr lang="en-US" dirty="0" smtClean="0"/>
           </a:p>
           <a:p>
             <a:r>
               <a:rPr lang="en-US" dirty="0" smtClean="0"/>
-              <a:t>Players can collide with monsters.</a:t>
-            </a:r>
-          </a:p>
-          <a:p>
+              <a:t>Players </a:t>
+            </a:r>
             <a:r>
               <a:rPr lang="en-US" dirty="0" smtClean="0"/>
-              <a:t>Players can be crushed by rocks.</a:t>
-            </a:r>
-          </a:p>
-          <a:p>
-            <a:r>
-              <a:rPr lang="en-US" dirty="0" smtClean="0"/>
-              <a:t>Players can take </a:t>
+              <a:t>can take </a:t>
             </a:r>
             <a:r>
               <a:rPr lang="en-US" dirty="0" err="1" smtClean="0"/>
@@ -7152,6 +7169,25 @@
               <a:rPr lang="en-US" dirty="0" smtClean="0"/>
               <a:t>.</a:t>
             </a:r>
+          </a:p>
+          <a:p>
+            <a:r>
+              <a:rPr lang="en-US" dirty="0" smtClean="0"/>
+              <a:t>Players can collide with eggs</a:t>
+            </a:r>
+          </a:p>
+          <a:p>
+            <a:r>
+              <a:rPr lang="en-US" dirty="0" smtClean="0"/>
+              <a:t>Player can collide with “bullets”</a:t>
+            </a:r>
+          </a:p>
+          <a:p>
+            <a:r>
+              <a:rPr lang="en-US" dirty="0" smtClean="0"/>
+              <a:t>Bonus: Player collide with another Player?</a:t>
+            </a:r>
+            <a:endParaRPr lang="en-US" dirty="0" smtClean="0"/>
           </a:p>
           <a:p>
             <a:endParaRPr lang="en-US" dirty="0"/>
@@ -7186,10 +7222,17 @@
       <p:transition spd="slow"/>
     </mc:Fallback>
   </mc:AlternateContent>
+  <p:timing>
+    <p:tnLst>
+      <p:par>
+        <p:cTn id="1" dur="indefinite" restart="never" nodeType="tmRoot"/>
+      </p:par>
+    </p:tnLst>
+  </p:timing>
 </p:sld>
 </file>
 
-<file path=ppt/slides/slide3.xml><?xml version="1.0" encoding="utf-8"?>
+<file path=ppt/slides/slide20.xml><?xml version="1.0" encoding="utf-8"?>
 <p:sld xmlns:a="http://schemas.openxmlformats.org/drawingml/2006/main" xmlns:r="http://schemas.openxmlformats.org/officeDocument/2006/relationships" xmlns:p="http://schemas.openxmlformats.org/presentationml/2006/main">
   <p:cSld>
     <p:spTree>
@@ -7223,7 +7266,7 @@
           <a:p>
             <a:r>
               <a:rPr lang="en-US" dirty="0" smtClean="0"/>
-              <a:t>Handling Collisions in General</a:t>
+              <a:t>Platforms and Drops</a:t>
             </a:r>
             <a:endParaRPr lang="en-US" dirty="0"/>
           </a:p>
@@ -7239,503 +7282,59 @@
             <p:ph idx="1"/>
           </p:nvPr>
         </p:nvSpPr>
-        <p:spPr/>
+        <p:spPr>
+          <a:xfrm>
+            <a:off x="152400" y="1242218"/>
+            <a:ext cx="8534400" cy="4525963"/>
+          </a:xfrm>
+        </p:spPr>
         <p:txBody>
           <a:bodyPr/>
           <a:lstStyle/>
           <a:p>
             <a:r>
+              <a:rPr lang="en-US" dirty="0" err="1" smtClean="0"/>
+              <a:t>AbstractPlatform</a:t>
+            </a:r>
+            <a:r>
               <a:rPr lang="en-US" dirty="0" smtClean="0"/>
-              <a:t>Many ways it can be done</a:t>
-            </a:r>
-          </a:p>
-          <a:p>
+              <a:t> and  </a:t>
+            </a:r>
+            <a:r>
+              <a:rPr lang="en-US" dirty="0" err="1" smtClean="0"/>
+              <a:t>AbstractDrop</a:t>
+            </a:r>
+            <a:endParaRPr lang="en-US" dirty="0" smtClean="0"/>
+          </a:p>
+          <a:p>
+            <a:pPr lvl="1"/>
             <a:r>
               <a:rPr lang="en-US" dirty="0" smtClean="0"/>
-              <a:t>Good design principles</a:t>
+              <a:t>Subclasses implement </a:t>
             </a:r>
           </a:p>
           <a:p>
             <a:pPr lvl="1"/>
             <a:r>
+              <a:rPr lang="en-US" dirty="0" err="1" smtClean="0"/>
+              <a:t>collideWith</a:t>
+            </a:r>
+            <a:r>
               <a:rPr lang="en-US" dirty="0" smtClean="0"/>
-              <a:t>Make it </a:t>
-            </a:r>
-            <a:r>
-              <a:rPr lang="en-US" b="1" dirty="0" smtClean="0"/>
-              <a:t>easy to use and extend code</a:t>
-            </a:r>
-          </a:p>
-          <a:p>
+              <a:t>(</a:t>
+            </a:r>
+            <a:r>
+              <a:rPr lang="en-US" dirty="0" err="1" smtClean="0"/>
+              <a:t>AbstractPlatform</a:t>
+            </a:r>
             <a:r>
               <a:rPr lang="en-US" dirty="0" smtClean="0"/>
-              <a:t>Functional but bad design principles</a:t>
-            </a:r>
+              <a:t>)</a:t>
+            </a:r>
+            <a:endParaRPr lang="en-US" dirty="0"/>
           </a:p>
           <a:p>
             <a:pPr lvl="1"/>
-            <a:r>
-              <a:rPr lang="en-US" dirty="0" smtClean="0"/>
-              <a:t>Use “type predicated code”</a:t>
-            </a:r>
-          </a:p>
-          <a:p>
-            <a:pPr lvl="1"/>
-            <a:r>
-              <a:rPr lang="en-US" dirty="0" smtClean="0"/>
-              <a:t>… if ( “</a:t>
-            </a:r>
-            <a:r>
-              <a:rPr lang="en-US" dirty="0" err="1"/>
-              <a:t>i</a:t>
-            </a:r>
-            <a:r>
-              <a:rPr lang="en-US" dirty="0" err="1" smtClean="0"/>
-              <a:t>nstanceof</a:t>
-            </a:r>
-            <a:r>
-              <a:rPr lang="en-US" dirty="0" smtClean="0"/>
-              <a:t>, </a:t>
-            </a:r>
-            <a:r>
-              <a:rPr lang="en-US" dirty="0" err="1" smtClean="0"/>
-              <a:t>getClass</a:t>
-            </a:r>
-            <a:r>
-              <a:rPr lang="en-US" dirty="0" smtClean="0"/>
-              <a:t>(), </a:t>
-            </a:r>
-            <a:r>
-              <a:rPr lang="en-US" dirty="0" err="1" smtClean="0"/>
-              <a:t>getType</a:t>
-            </a:r>
-            <a:r>
-              <a:rPr lang="en-US" dirty="0" smtClean="0"/>
-              <a:t>()” ==/equals)</a:t>
-            </a:r>
-          </a:p>
-          <a:p>
-            <a:pPr lvl="1"/>
-            <a:r>
-              <a:rPr lang="en-US" dirty="0" smtClean="0"/>
-              <a:t>OUTLAWED in your project design!</a:t>
-            </a:r>
-          </a:p>
-          <a:p>
-            <a:pPr lvl="1"/>
-            <a:r>
-              <a:rPr lang="en-US" dirty="0" smtClean="0"/>
-              <a:t>Your design should not use these at all!</a:t>
-            </a:r>
-            <a:endParaRPr lang="en-US" dirty="0"/>
-          </a:p>
-        </p:txBody>
-      </p:sp>
-    </p:spTree>
-    <p:extLst>
-      <p:ext uri="{BB962C8B-B14F-4D97-AF65-F5344CB8AC3E}">
-        <p14:creationId xmlns:p14="http://schemas.microsoft.com/office/powerpoint/2010/main" val="1608855851"/>
-      </p:ext>
-    </p:extLst>
-  </p:cSld>
-  <p:clrMapOvr>
-    <a:masterClrMapping/>
-  </p:clrMapOvr>
-</p:sld>
-</file>
-
-<file path=ppt/slides/slide4.xml><?xml version="1.0" encoding="utf-8"?>
-<p:sld xmlns:a="http://schemas.openxmlformats.org/drawingml/2006/main" xmlns:r="http://schemas.openxmlformats.org/officeDocument/2006/relationships" xmlns:p="http://schemas.openxmlformats.org/presentationml/2006/main">
-  <p:cSld>
-    <p:spTree>
-      <p:nvGrpSpPr>
-        <p:cNvPr id="1" name=""/>
-        <p:cNvGrpSpPr/>
-        <p:nvPr/>
-      </p:nvGrpSpPr>
-      <p:grpSpPr>
-        <a:xfrm>
-          <a:off x="0" y="0"/>
-          <a:ext cx="0" cy="0"/>
-          <a:chOff x="0" y="0"/>
-          <a:chExt cx="0" cy="0"/>
-        </a:xfrm>
-      </p:grpSpPr>
-      <p:sp>
-        <p:nvSpPr>
-          <p:cNvPr id="2" name="Title 1"/>
-          <p:cNvSpPr>
-            <a:spLocks noGrp="1"/>
-          </p:cNvSpPr>
-          <p:nvPr>
-            <p:ph type="title"/>
-          </p:nvPr>
-        </p:nvSpPr>
-        <p:spPr/>
-        <p:txBody>
-          <a:bodyPr/>
-          <a:lstStyle/>
-          <a:p>
-            <a:r>
-              <a:rPr lang="en-US" dirty="0" smtClean="0"/>
-              <a:t>Live Coding</a:t>
-            </a:r>
-            <a:endParaRPr lang="en-US" dirty="0"/>
-          </a:p>
-        </p:txBody>
-      </p:sp>
-      <p:sp>
-        <p:nvSpPr>
-          <p:cNvPr id="3" name="Content Placeholder 2"/>
-          <p:cNvSpPr>
-            <a:spLocks noGrp="1"/>
-          </p:cNvSpPr>
-          <p:nvPr>
-            <p:ph idx="1"/>
-          </p:nvPr>
-        </p:nvSpPr>
-        <p:spPr/>
-        <p:txBody>
-          <a:bodyPr/>
-          <a:lstStyle/>
-          <a:p>
-            <a:r>
-              <a:rPr lang="en-US" dirty="0" smtClean="0"/>
-              <a:t>Let’s consider a simulator with collisions</a:t>
-            </a:r>
-          </a:p>
-          <a:p>
-            <a:r>
-              <a:rPr lang="en-US" dirty="0" smtClean="0"/>
-              <a:t>More Raindrops More Platforms</a:t>
-            </a:r>
-          </a:p>
-          <a:p>
-            <a:r>
-              <a:rPr lang="en-US" dirty="0" smtClean="0"/>
-              <a:t>Run Main.java</a:t>
-            </a:r>
-          </a:p>
-          <a:p>
-            <a:endParaRPr lang="en-US" dirty="0"/>
-          </a:p>
-        </p:txBody>
-      </p:sp>
-    </p:spTree>
-    <p:extLst>
-      <p:ext uri="{BB962C8B-B14F-4D97-AF65-F5344CB8AC3E}">
-        <p14:creationId xmlns:p14="http://schemas.microsoft.com/office/powerpoint/2010/main" val="1736097128"/>
-      </p:ext>
-    </p:extLst>
-  </p:cSld>
-  <p:clrMapOvr>
-    <a:masterClrMapping/>
-  </p:clrMapOvr>
-</p:sld>
-</file>
-
-<file path=ppt/slides/slide5.xml><?xml version="1.0" encoding="utf-8"?>
-<p:sld xmlns:a="http://schemas.openxmlformats.org/drawingml/2006/main" xmlns:r="http://schemas.openxmlformats.org/officeDocument/2006/relationships" xmlns:p="http://schemas.openxmlformats.org/presentationml/2006/main">
-  <p:cSld>
-    <p:spTree>
-      <p:nvGrpSpPr>
-        <p:cNvPr id="1" name=""/>
-        <p:cNvGrpSpPr/>
-        <p:nvPr/>
-      </p:nvGrpSpPr>
-      <p:grpSpPr>
-        <a:xfrm>
-          <a:off x="0" y="0"/>
-          <a:ext cx="0" cy="0"/>
-          <a:chOff x="0" y="0"/>
-          <a:chExt cx="0" cy="0"/>
-        </a:xfrm>
-      </p:grpSpPr>
-      <p:sp>
-        <p:nvSpPr>
-          <p:cNvPr id="2" name="Title 1"/>
-          <p:cNvSpPr>
-            <a:spLocks noGrp="1"/>
-          </p:cNvSpPr>
-          <p:nvPr>
-            <p:ph type="title"/>
-          </p:nvPr>
-        </p:nvSpPr>
-        <p:spPr/>
-        <p:txBody>
-          <a:bodyPr/>
-          <a:lstStyle/>
-          <a:p>
-            <a:r>
-              <a:rPr lang="en-US" dirty="0" smtClean="0"/>
-              <a:t>Extend Functionality</a:t>
-            </a:r>
-            <a:endParaRPr lang="en-US" dirty="0"/>
-          </a:p>
-        </p:txBody>
-      </p:sp>
-      <p:sp>
-        <p:nvSpPr>
-          <p:cNvPr id="3" name="Content Placeholder 2"/>
-          <p:cNvSpPr>
-            <a:spLocks noGrp="1"/>
-          </p:cNvSpPr>
-          <p:nvPr>
-            <p:ph idx="1"/>
-          </p:nvPr>
-        </p:nvSpPr>
-        <p:spPr/>
-        <p:txBody>
-          <a:bodyPr/>
-          <a:lstStyle/>
-          <a:p>
-            <a:r>
-              <a:rPr lang="en-US" dirty="0"/>
-              <a:t>Implement an </a:t>
-            </a:r>
-            <a:r>
-              <a:rPr lang="en-US" dirty="0" err="1"/>
-              <a:t>InvincibilityDrop</a:t>
-            </a:r>
-            <a:r>
-              <a:rPr lang="en-US" dirty="0"/>
-              <a:t> </a:t>
-            </a:r>
-          </a:p>
-          <a:p>
-            <a:pPr lvl="1"/>
-            <a:r>
-              <a:rPr lang="en-US" dirty="0" smtClean="0"/>
-              <a:t>makes </a:t>
-            </a:r>
-            <a:r>
-              <a:rPr lang="en-US" dirty="0"/>
-              <a:t>a </a:t>
-            </a:r>
-            <a:r>
-              <a:rPr lang="en-US" dirty="0" err="1"/>
-              <a:t>BouncingPlatform</a:t>
-            </a:r>
-            <a:r>
-              <a:rPr lang="en-US" dirty="0"/>
-              <a:t> </a:t>
-            </a:r>
-            <a:r>
-              <a:rPr lang="en-US" dirty="0" smtClean="0"/>
-              <a:t>invincible </a:t>
-            </a:r>
-            <a:r>
-              <a:rPr lang="en-US" dirty="0"/>
-              <a:t>for 50 </a:t>
-            </a:r>
-            <a:r>
-              <a:rPr lang="en-US" dirty="0" smtClean="0"/>
-              <a:t>ticks</a:t>
-            </a:r>
-            <a:r>
-              <a:rPr lang="en-US" u="sng" dirty="0" smtClean="0"/>
-              <a:t> </a:t>
-            </a:r>
-            <a:endParaRPr lang="en-US" dirty="0"/>
-          </a:p>
-          <a:p>
-            <a:pPr lvl="1"/>
-            <a:r>
-              <a:rPr lang="en-US" dirty="0" smtClean="0"/>
-              <a:t>drops should not affect platforms when invincible</a:t>
-            </a:r>
-            <a:endParaRPr lang="en-US" dirty="0"/>
-          </a:p>
-          <a:p>
-            <a:pPr lvl="1"/>
-            <a:r>
-              <a:rPr lang="en-US" dirty="0" smtClean="0"/>
-              <a:t>color </a:t>
-            </a:r>
-            <a:r>
-              <a:rPr lang="en-US" dirty="0"/>
-              <a:t>should be Yellow</a:t>
-            </a:r>
-          </a:p>
-          <a:p>
-            <a:pPr lvl="1"/>
-            <a:r>
-              <a:rPr lang="en-US" dirty="0" smtClean="0"/>
-              <a:t>size </a:t>
-            </a:r>
-            <a:r>
-              <a:rPr lang="en-US" dirty="0"/>
-              <a:t>should be </a:t>
-            </a:r>
-            <a:r>
-              <a:rPr lang="en-US" dirty="0" smtClean="0"/>
-              <a:t>20</a:t>
-            </a:r>
-          </a:p>
-          <a:p>
-            <a:pPr lvl="1"/>
-            <a:r>
-              <a:rPr lang="en-US" dirty="0" smtClean="0"/>
-              <a:t>absorbed by </a:t>
-            </a:r>
-            <a:r>
-              <a:rPr lang="en-US" dirty="0" err="1" smtClean="0"/>
-              <a:t>UserControlledPlatform</a:t>
-            </a:r>
-            <a:r>
-              <a:rPr lang="en-US" dirty="0" smtClean="0"/>
-              <a:t> like others</a:t>
-            </a:r>
-            <a:endParaRPr lang="en-US" dirty="0"/>
-          </a:p>
-        </p:txBody>
-      </p:sp>
-    </p:spTree>
-    <p:extLst>
-      <p:ext uri="{BB962C8B-B14F-4D97-AF65-F5344CB8AC3E}">
-        <p14:creationId xmlns:p14="http://schemas.microsoft.com/office/powerpoint/2010/main" val="3961337595"/>
-      </p:ext>
-    </p:extLst>
-  </p:cSld>
-  <p:clrMapOvr>
-    <a:masterClrMapping/>
-  </p:clrMapOvr>
-</p:sld>
-</file>
-
-<file path=ppt/slides/slide6.xml><?xml version="1.0" encoding="utf-8"?>
-<p:sld xmlns:a="http://schemas.openxmlformats.org/drawingml/2006/main" xmlns:r="http://schemas.openxmlformats.org/officeDocument/2006/relationships" xmlns:p="http://schemas.openxmlformats.org/presentationml/2006/main">
-  <p:cSld>
-    <p:spTree>
-      <p:nvGrpSpPr>
-        <p:cNvPr id="1" name=""/>
-        <p:cNvGrpSpPr/>
-        <p:nvPr/>
-      </p:nvGrpSpPr>
-      <p:grpSpPr>
-        <a:xfrm>
-          <a:off x="0" y="0"/>
-          <a:ext cx="0" cy="0"/>
-          <a:chOff x="0" y="0"/>
-          <a:chExt cx="0" cy="0"/>
-        </a:xfrm>
-      </p:grpSpPr>
-      <p:sp>
-        <p:nvSpPr>
-          <p:cNvPr id="2" name="Title 1"/>
-          <p:cNvSpPr>
-            <a:spLocks noGrp="1"/>
-          </p:cNvSpPr>
-          <p:nvPr>
-            <p:ph type="title"/>
-          </p:nvPr>
-        </p:nvSpPr>
-        <p:spPr/>
-        <p:txBody>
-          <a:bodyPr/>
-          <a:lstStyle/>
-          <a:p>
-            <a:r>
-              <a:rPr lang="en-US" dirty="0" smtClean="0"/>
-              <a:t>GameComponent.java</a:t>
-            </a:r>
-            <a:endParaRPr lang="en-US" dirty="0"/>
-          </a:p>
-        </p:txBody>
-      </p:sp>
-      <p:sp>
-        <p:nvSpPr>
-          <p:cNvPr id="3" name="Content Placeholder 2"/>
-          <p:cNvSpPr>
-            <a:spLocks noGrp="1"/>
-          </p:cNvSpPr>
-          <p:nvPr>
-            <p:ph idx="1"/>
-          </p:nvPr>
-        </p:nvSpPr>
-        <p:spPr/>
-        <p:txBody>
-          <a:bodyPr/>
-          <a:lstStyle/>
-          <a:p>
-            <a:r>
-              <a:rPr lang="en-US" sz="2800" dirty="0" smtClean="0"/>
-              <a:t>Let’s look how collisions are handled</a:t>
-            </a:r>
-          </a:p>
-          <a:p>
-            <a:r>
-              <a:rPr lang="en-US" sz="2800" dirty="0" smtClean="0"/>
-              <a:t>Where would changes in code need to happen?</a:t>
-            </a:r>
-          </a:p>
-          <a:p>
-            <a:r>
-              <a:rPr lang="en-US" sz="2800" dirty="0" smtClean="0"/>
-              <a:t>Look for examples of “type predicated code”</a:t>
-            </a:r>
-          </a:p>
-          <a:p>
-            <a:pPr lvl="1"/>
-            <a:r>
-              <a:rPr lang="en-US" sz="2400" dirty="0" smtClean="0"/>
-              <a:t>Why is this hard to use/extend?</a:t>
-            </a:r>
-          </a:p>
-          <a:p>
-            <a:endParaRPr lang="en-US" sz="2800" dirty="0"/>
-          </a:p>
-        </p:txBody>
-      </p:sp>
-    </p:spTree>
-    <p:extLst>
-      <p:ext uri="{BB962C8B-B14F-4D97-AF65-F5344CB8AC3E}">
-        <p14:creationId xmlns:p14="http://schemas.microsoft.com/office/powerpoint/2010/main" val="4276672556"/>
-      </p:ext>
-    </p:extLst>
-  </p:cSld>
-  <p:clrMapOvr>
-    <a:masterClrMapping/>
-  </p:clrMapOvr>
-</p:sld>
-</file>
-
-<file path=ppt/slides/slide7.xml><?xml version="1.0" encoding="utf-8"?>
-<p:sld xmlns:a="http://schemas.openxmlformats.org/drawingml/2006/main" xmlns:r="http://schemas.openxmlformats.org/officeDocument/2006/relationships" xmlns:p="http://schemas.openxmlformats.org/presentationml/2006/main">
-  <p:cSld>
-    <p:spTree>
-      <p:nvGrpSpPr>
-        <p:cNvPr id="1" name=""/>
-        <p:cNvGrpSpPr/>
-        <p:nvPr/>
-      </p:nvGrpSpPr>
-      <p:grpSpPr>
-        <a:xfrm>
-          <a:off x="0" y="0"/>
-          <a:ext cx="0" cy="0"/>
-          <a:chOff x="0" y="0"/>
-          <a:chExt cx="0" cy="0"/>
-        </a:xfrm>
-      </p:grpSpPr>
-      <p:sp>
-        <p:nvSpPr>
-          <p:cNvPr id="2" name="Title 1"/>
-          <p:cNvSpPr>
-            <a:spLocks noGrp="1"/>
-          </p:cNvSpPr>
-          <p:nvPr>
-            <p:ph type="title"/>
-          </p:nvPr>
-        </p:nvSpPr>
-        <p:spPr/>
-        <p:txBody>
-          <a:bodyPr/>
-          <a:lstStyle/>
-          <a:p>
-            <a:r>
-              <a:rPr lang="en-US" dirty="0" smtClean="0"/>
-              <a:t>Collision Chart</a:t>
-            </a:r>
             <a:endParaRPr lang="en-US" dirty="0"/>
           </a:p>
         </p:txBody>
@@ -7749,7 +7348,7 @@
           <p:nvPr>
             <p:extLst>
               <p:ext uri="{D42A27DB-BD31-4B8C-83A1-F6EECF244321}">
-                <p14:modId xmlns:p14="http://schemas.microsoft.com/office/powerpoint/2010/main" val="1486781072"/>
+                <p14:modId xmlns:p14="http://schemas.microsoft.com/office/powerpoint/2010/main" val="3577914708"/>
               </p:ext>
             </p:extLst>
           </p:nvPr>
@@ -7904,6 +7503,10 @@
                     <a:bodyPr/>
                     <a:lstStyle/>
                     <a:p>
+                      <a:r>
+                        <a:rPr lang="en-US" sz="2400" dirty="0" smtClean="0"/>
+                        <a:t>X</a:t>
+                      </a:r>
                       <a:endParaRPr lang="en-US" sz="2400" dirty="0"/>
                     </a:p>
                   </a:txBody>
@@ -7914,6 +7517,10 @@
                     <a:bodyPr/>
                     <a:lstStyle/>
                     <a:p>
+                      <a:r>
+                        <a:rPr lang="en-US" sz="2400" dirty="0" smtClean="0"/>
+                        <a:t>X</a:t>
+                      </a:r>
                       <a:endParaRPr lang="en-US" sz="2400" dirty="0"/>
                     </a:p>
                   </a:txBody>
@@ -7924,7 +7531,11 @@
                     <a:bodyPr/>
                     <a:lstStyle/>
                     <a:p>
-                      <a:endParaRPr lang="en-US" sz="2400"/>
+                      <a:r>
+                        <a:rPr lang="en-US" sz="2400" dirty="0" smtClean="0"/>
+                        <a:t>X</a:t>
+                      </a:r>
+                      <a:endParaRPr lang="en-US" sz="2400" dirty="0"/>
                     </a:p>
                   </a:txBody>
                   <a:tcPr marL="129683" marR="129683" marT="64842" marB="64842"/>
@@ -7955,26 +7566,10 @@
                     <a:bodyPr/>
                     <a:lstStyle/>
                     <a:p>
-                      <a:endParaRPr lang="en-US" sz="2400"/>
-                    </a:p>
-                  </a:txBody>
-                  <a:tcPr marL="129683" marR="129683" marT="64842" marB="64842"/>
-                </a:tc>
-                <a:tc>
-                  <a:txBody>
-                    <a:bodyPr/>
-                    <a:lstStyle/>
-                    <a:p>
-                      <a:endParaRPr lang="en-US" sz="2400"/>
-                    </a:p>
-                  </a:txBody>
-                  <a:tcPr marL="129683" marR="129683" marT="64842" marB="64842"/>
-                </a:tc>
-                <a:tc>
-                  <a:txBody>
-                    <a:bodyPr/>
-                    <a:lstStyle/>
-                    <a:p>
+                      <a:r>
+                        <a:rPr lang="en-US" sz="2400" dirty="0" smtClean="0"/>
+                        <a:t>X</a:t>
+                      </a:r>
                       <a:endParaRPr lang="en-US" sz="2400" dirty="0"/>
                     </a:p>
                   </a:txBody>
@@ -7985,7 +7580,39 @@
                     <a:bodyPr/>
                     <a:lstStyle/>
                     <a:p>
-                      <a:endParaRPr lang="en-US" sz="2400"/>
+                      <a:r>
+                        <a:rPr lang="en-US" sz="2400" dirty="0" smtClean="0"/>
+                        <a:t>X</a:t>
+                      </a:r>
+                      <a:endParaRPr lang="en-US" sz="2400" dirty="0"/>
+                    </a:p>
+                  </a:txBody>
+                  <a:tcPr marL="129683" marR="129683" marT="64842" marB="64842"/>
+                </a:tc>
+                <a:tc>
+                  <a:txBody>
+                    <a:bodyPr/>
+                    <a:lstStyle/>
+                    <a:p>
+                      <a:r>
+                        <a:rPr lang="en-US" sz="2400" dirty="0" smtClean="0"/>
+                        <a:t>X</a:t>
+                      </a:r>
+                      <a:endParaRPr lang="en-US" sz="2400" dirty="0"/>
+                    </a:p>
+                  </a:txBody>
+                  <a:tcPr marL="129683" marR="129683" marT="64842" marB="64842"/>
+                </a:tc>
+                <a:tc>
+                  <a:txBody>
+                    <a:bodyPr/>
+                    <a:lstStyle/>
+                    <a:p>
+                      <a:r>
+                        <a:rPr lang="en-US" sz="2400" dirty="0" smtClean="0"/>
+                        <a:t>X</a:t>
+                      </a:r>
+                      <a:endParaRPr lang="en-US" sz="2400" dirty="0"/>
                     </a:p>
                   </a:txBody>
                   <a:tcPr marL="129683" marR="129683" marT="64842" marB="64842"/>
@@ -8016,17 +7643,25 @@
                     <a:bodyPr/>
                     <a:lstStyle/>
                     <a:p>
-                      <a:endParaRPr lang="en-US" sz="2400"/>
-                    </a:p>
-                  </a:txBody>
-                  <a:tcPr marL="129683" marR="129683" marT="64842" marB="64842"/>
-                </a:tc>
-                <a:tc>
-                  <a:txBody>
-                    <a:bodyPr/>
-                    <a:lstStyle/>
-                    <a:p>
-                      <a:endParaRPr lang="en-US" sz="2400"/>
+                      <a:r>
+                        <a:rPr lang="en-US" sz="2400" dirty="0" smtClean="0"/>
+                        <a:t>X</a:t>
+                      </a:r>
+                      <a:endParaRPr lang="en-US" sz="2400" dirty="0"/>
+                    </a:p>
+                  </a:txBody>
+                  <a:tcPr marL="129683" marR="129683" marT="64842" marB="64842"/>
+                </a:tc>
+                <a:tc>
+                  <a:txBody>
+                    <a:bodyPr/>
+                    <a:lstStyle/>
+                    <a:p>
+                      <a:r>
+                        <a:rPr lang="en-US" sz="2400" dirty="0" smtClean="0"/>
+                        <a:t>X</a:t>
+                      </a:r>
+                      <a:endParaRPr lang="en-US" sz="2400" dirty="0"/>
                     </a:p>
                   </a:txBody>
                   <a:tcPr marL="129683" marR="129683" marT="64842" marB="64842"/>
@@ -8077,17 +7712,25 @@
                     <a:bodyPr/>
                     <a:lstStyle/>
                     <a:p>
-                      <a:endParaRPr lang="en-US" sz="2400"/>
-                    </a:p>
-                  </a:txBody>
-                  <a:tcPr marL="129683" marR="129683" marT="64842" marB="64842"/>
-                </a:tc>
-                <a:tc>
-                  <a:txBody>
-                    <a:bodyPr/>
-                    <a:lstStyle/>
-                    <a:p>
-                      <a:endParaRPr lang="en-US" sz="2400"/>
+                      <a:r>
+                        <a:rPr lang="en-US" sz="2400" dirty="0" smtClean="0"/>
+                        <a:t>X</a:t>
+                      </a:r>
+                      <a:endParaRPr lang="en-US" sz="2400" dirty="0"/>
+                    </a:p>
+                  </a:txBody>
+                  <a:tcPr marL="129683" marR="129683" marT="64842" marB="64842"/>
+                </a:tc>
+                <a:tc>
+                  <a:txBody>
+                    <a:bodyPr/>
+                    <a:lstStyle/>
+                    <a:p>
+                      <a:r>
+                        <a:rPr lang="en-US" sz="2400" dirty="0" smtClean="0"/>
+                        <a:t>X</a:t>
+                      </a:r>
+                      <a:endParaRPr lang="en-US" sz="2400" dirty="0"/>
                     </a:p>
                   </a:txBody>
                   <a:tcPr marL="129683" marR="129683" marT="64842" marB="64842"/>
@@ -8122,46 +7765,812 @@
           </a:graphicData>
         </a:graphic>
       </p:graphicFrame>
-      <p:sp>
-        <p:nvSpPr>
-          <p:cNvPr id="5" name="TextBox 4"/>
-          <p:cNvSpPr txBox="1"/>
-          <p:nvPr/>
-        </p:nvSpPr>
-        <p:spPr>
-          <a:xfrm>
-            <a:off x="359226" y="2438400"/>
-            <a:ext cx="8449612" cy="584775"/>
-          </a:xfrm>
-          <a:prstGeom prst="rect">
-            <a:avLst/>
-          </a:prstGeom>
-          <a:noFill/>
-        </p:spPr>
-        <p:txBody>
-          <a:bodyPr wrap="square" rtlCol="0">
-            <a:spAutoFit/>
-          </a:bodyPr>
-          <a:lstStyle/>
-          <a:p>
-            <a:r>
-              <a:rPr lang="en-US" sz="3200" dirty="0" smtClean="0"/>
-              <a:t>When do collisions happen?</a:t>
-            </a:r>
-            <a:endParaRPr lang="en-US" sz="3200" dirty="0"/>
-          </a:p>
-        </p:txBody>
-      </p:sp>
     </p:spTree>
     <p:extLst>
       <p:ext uri="{BB962C8B-B14F-4D97-AF65-F5344CB8AC3E}">
-        <p14:creationId xmlns:p14="http://schemas.microsoft.com/office/powerpoint/2010/main" val="1718063911"/>
+        <p14:creationId xmlns:p14="http://schemas.microsoft.com/office/powerpoint/2010/main" val="1951997951"/>
       </p:ext>
     </p:extLst>
   </p:cSld>
   <p:clrMapOvr>
     <a:masterClrMapping/>
   </p:clrMapOvr>
+  <p:timing>
+    <p:tnLst>
+      <p:par>
+        <p:cTn id="1" dur="indefinite" restart="never" nodeType="tmRoot"/>
+      </p:par>
+    </p:tnLst>
+  </p:timing>
+</p:sld>
+</file>
+
+<file path=ppt/slides/slide21.xml><?xml version="1.0" encoding="utf-8"?>
+<p:sld xmlns:a="http://schemas.openxmlformats.org/drawingml/2006/main" xmlns:r="http://schemas.openxmlformats.org/officeDocument/2006/relationships" xmlns:p="http://schemas.openxmlformats.org/presentationml/2006/main">
+  <p:cSld>
+    <p:spTree>
+      <p:nvGrpSpPr>
+        <p:cNvPr id="1" name=""/>
+        <p:cNvGrpSpPr/>
+        <p:nvPr/>
+      </p:nvGrpSpPr>
+      <p:grpSpPr>
+        <a:xfrm>
+          <a:off x="0" y="0"/>
+          <a:ext cx="0" cy="0"/>
+          <a:chOff x="0" y="0"/>
+          <a:chExt cx="0" cy="0"/>
+        </a:xfrm>
+      </p:grpSpPr>
+      <p:sp>
+        <p:nvSpPr>
+          <p:cNvPr id="2" name="Title 1"/>
+          <p:cNvSpPr>
+            <a:spLocks noGrp="1"/>
+          </p:cNvSpPr>
+          <p:nvPr>
+            <p:ph type="title"/>
+          </p:nvPr>
+        </p:nvSpPr>
+        <p:spPr/>
+        <p:txBody>
+          <a:bodyPr/>
+          <a:lstStyle/>
+          <a:p>
+            <a:r>
+              <a:rPr lang="en-US" dirty="0" smtClean="0"/>
+              <a:t>Double/Multiple Dispatch</a:t>
+            </a:r>
+            <a:endParaRPr lang="en-US" dirty="0"/>
+          </a:p>
+        </p:txBody>
+      </p:sp>
+      <p:sp>
+        <p:nvSpPr>
+          <p:cNvPr id="3" name="Content Placeholder 2"/>
+          <p:cNvSpPr>
+            <a:spLocks noGrp="1"/>
+          </p:cNvSpPr>
+          <p:nvPr>
+            <p:ph idx="1"/>
+          </p:nvPr>
+        </p:nvSpPr>
+        <p:spPr/>
+        <p:txBody>
+          <a:bodyPr/>
+          <a:lstStyle/>
+          <a:p>
+            <a:r>
+              <a:rPr lang="en-US" dirty="0" smtClean="0"/>
+              <a:t>Another advanced technique</a:t>
+            </a:r>
+          </a:p>
+          <a:p>
+            <a:r>
+              <a:rPr lang="en-US" dirty="0" smtClean="0"/>
+              <a:t>Helps especially when you want to store all objects in a single list</a:t>
+            </a:r>
+          </a:p>
+          <a:p>
+            <a:r>
+              <a:rPr lang="en-US" dirty="0" smtClean="0"/>
+              <a:t>Requires some boilerplate code</a:t>
+            </a:r>
+          </a:p>
+          <a:p>
+            <a:r>
+              <a:rPr lang="en-US" dirty="0" smtClean="0"/>
+              <a:t>Trade-offs as with many design choices</a:t>
+            </a:r>
+          </a:p>
+          <a:p>
+            <a:r>
+              <a:rPr lang="en-US" dirty="0" smtClean="0"/>
+              <a:t>When many different things are interacting with many different things</a:t>
+            </a:r>
+          </a:p>
+          <a:p>
+            <a:r>
+              <a:rPr lang="en-US" dirty="0" smtClean="0"/>
+              <a:t>Additional slides and project available to see</a:t>
+            </a:r>
+            <a:endParaRPr lang="en-US" dirty="0"/>
+          </a:p>
+        </p:txBody>
+      </p:sp>
+    </p:spTree>
+    <p:extLst>
+      <p:ext uri="{BB962C8B-B14F-4D97-AF65-F5344CB8AC3E}">
+        <p14:creationId xmlns:p14="http://schemas.microsoft.com/office/powerpoint/2010/main" val="310926887"/>
+      </p:ext>
+    </p:extLst>
+  </p:cSld>
+  <p:clrMapOvr>
+    <a:masterClrMapping/>
+  </p:clrMapOvr>
+  <p:timing>
+    <p:tnLst>
+      <p:par>
+        <p:cTn id="1" dur="indefinite" restart="never" nodeType="tmRoot"/>
+      </p:par>
+    </p:tnLst>
+  </p:timing>
+</p:sld>
+</file>
+
+<file path=ppt/slides/slide3.xml><?xml version="1.0" encoding="utf-8"?>
+<p:sld xmlns:a="http://schemas.openxmlformats.org/drawingml/2006/main" xmlns:r="http://schemas.openxmlformats.org/officeDocument/2006/relationships" xmlns:p="http://schemas.openxmlformats.org/presentationml/2006/main" show="0">
+  <p:cSld>
+    <p:spTree>
+      <p:nvGrpSpPr>
+        <p:cNvPr id="1" name=""/>
+        <p:cNvGrpSpPr/>
+        <p:nvPr/>
+      </p:nvGrpSpPr>
+      <p:grpSpPr>
+        <a:xfrm>
+          <a:off x="0" y="0"/>
+          <a:ext cx="0" cy="0"/>
+          <a:chOff x="0" y="0"/>
+          <a:chExt cx="0" cy="0"/>
+        </a:xfrm>
+      </p:grpSpPr>
+      <p:sp>
+        <p:nvSpPr>
+          <p:cNvPr id="2" name="Title 1"/>
+          <p:cNvSpPr>
+            <a:spLocks noGrp="1"/>
+          </p:cNvSpPr>
+          <p:nvPr>
+            <p:ph type="title"/>
+          </p:nvPr>
+        </p:nvSpPr>
+        <p:spPr/>
+        <p:txBody>
+          <a:bodyPr/>
+          <a:lstStyle/>
+          <a:p>
+            <a:r>
+              <a:rPr lang="en-US" dirty="0" smtClean="0"/>
+              <a:t>The specific problem</a:t>
+            </a:r>
+            <a:endParaRPr lang="en-US" dirty="0"/>
+          </a:p>
+        </p:txBody>
+      </p:sp>
+      <p:sp>
+        <p:nvSpPr>
+          <p:cNvPr id="3" name="Content Placeholder 2"/>
+          <p:cNvSpPr>
+            <a:spLocks noGrp="1"/>
+          </p:cNvSpPr>
+          <p:nvPr>
+            <p:ph idx="1"/>
+          </p:nvPr>
+        </p:nvSpPr>
+        <p:spPr/>
+        <p:txBody>
+          <a:bodyPr>
+            <a:normAutofit/>
+          </a:bodyPr>
+          <a:lstStyle/>
+          <a:p>
+            <a:r>
+              <a:rPr lang="en-US" dirty="0" smtClean="0"/>
+              <a:t>Monsters can collide with rocks.</a:t>
+            </a:r>
+          </a:p>
+          <a:p>
+            <a:r>
+              <a:rPr lang="en-US" dirty="0" smtClean="0"/>
+              <a:t>Rocks can crush monsters.</a:t>
+            </a:r>
+          </a:p>
+          <a:p>
+            <a:r>
+              <a:rPr lang="en-US" dirty="0" smtClean="0"/>
+              <a:t>Players can collide with monsters.</a:t>
+            </a:r>
+          </a:p>
+          <a:p>
+            <a:r>
+              <a:rPr lang="en-US" dirty="0" smtClean="0"/>
+              <a:t>Players can be crushed by rocks.</a:t>
+            </a:r>
+          </a:p>
+          <a:p>
+            <a:r>
+              <a:rPr lang="en-US" dirty="0" smtClean="0"/>
+              <a:t>Players can take </a:t>
+            </a:r>
+            <a:r>
+              <a:rPr lang="en-US" dirty="0" err="1" smtClean="0"/>
+              <a:t>powerups</a:t>
+            </a:r>
+            <a:r>
+              <a:rPr lang="en-US" dirty="0" smtClean="0"/>
+              <a:t>.</a:t>
+            </a:r>
+          </a:p>
+          <a:p>
+            <a:endParaRPr lang="en-US" dirty="0"/>
+          </a:p>
+          <a:p>
+            <a:pPr marL="0" indent="0">
+              <a:buNone/>
+            </a:pPr>
+            <a:r>
+              <a:rPr lang="en-US" dirty="0" smtClean="0"/>
+              <a:t>So many collisions! How do we handle them all?</a:t>
+            </a:r>
+            <a:endParaRPr lang="en-US" dirty="0"/>
+          </a:p>
+        </p:txBody>
+      </p:sp>
+    </p:spTree>
+    <p:extLst>
+      <p:ext uri="{BB962C8B-B14F-4D97-AF65-F5344CB8AC3E}">
+        <p14:creationId xmlns:p14="http://schemas.microsoft.com/office/powerpoint/2010/main" val="3208378425"/>
+      </p:ext>
+    </p:extLst>
+  </p:cSld>
+  <p:clrMapOvr>
+    <a:masterClrMapping/>
+  </p:clrMapOvr>
+  <mc:AlternateContent xmlns:mc="http://schemas.openxmlformats.org/markup-compatibility/2006">
+    <mc:Choice xmlns:p14="http://schemas.microsoft.com/office/powerpoint/2010/main" Requires="p14">
+      <p:transition spd="slow" p14:dur="2000"/>
+    </mc:Choice>
+    <mc:Fallback>
+      <p:transition spd="slow"/>
+    </mc:Fallback>
+  </mc:AlternateContent>
+  <p:timing>
+    <p:tnLst>
+      <p:par>
+        <p:cTn id="1" dur="indefinite" restart="never" nodeType="tmRoot"/>
+      </p:par>
+    </p:tnLst>
+  </p:timing>
+</p:sld>
+</file>
+
+<file path=ppt/slides/slide4.xml><?xml version="1.0" encoding="utf-8"?>
+<p:sld xmlns:a="http://schemas.openxmlformats.org/drawingml/2006/main" xmlns:r="http://schemas.openxmlformats.org/officeDocument/2006/relationships" xmlns:p="http://schemas.openxmlformats.org/presentationml/2006/main">
+  <p:cSld>
+    <p:spTree>
+      <p:nvGrpSpPr>
+        <p:cNvPr id="1" name=""/>
+        <p:cNvGrpSpPr/>
+        <p:nvPr/>
+      </p:nvGrpSpPr>
+      <p:grpSpPr>
+        <a:xfrm>
+          <a:off x="0" y="0"/>
+          <a:ext cx="0" cy="0"/>
+          <a:chOff x="0" y="0"/>
+          <a:chExt cx="0" cy="0"/>
+        </a:xfrm>
+      </p:grpSpPr>
+      <p:sp>
+        <p:nvSpPr>
+          <p:cNvPr id="2" name="Title 1"/>
+          <p:cNvSpPr>
+            <a:spLocks noGrp="1"/>
+          </p:cNvSpPr>
+          <p:nvPr>
+            <p:ph type="title"/>
+          </p:nvPr>
+        </p:nvSpPr>
+        <p:spPr/>
+        <p:txBody>
+          <a:bodyPr/>
+          <a:lstStyle/>
+          <a:p>
+            <a:r>
+              <a:rPr lang="en-US" dirty="0" smtClean="0"/>
+              <a:t>Handling Collisions in General</a:t>
+            </a:r>
+            <a:endParaRPr lang="en-US" dirty="0"/>
+          </a:p>
+        </p:txBody>
+      </p:sp>
+      <p:sp>
+        <p:nvSpPr>
+          <p:cNvPr id="3" name="Content Placeholder 2"/>
+          <p:cNvSpPr>
+            <a:spLocks noGrp="1"/>
+          </p:cNvSpPr>
+          <p:nvPr>
+            <p:ph idx="1"/>
+          </p:nvPr>
+        </p:nvSpPr>
+        <p:spPr/>
+        <p:txBody>
+          <a:bodyPr/>
+          <a:lstStyle/>
+          <a:p>
+            <a:r>
+              <a:rPr lang="en-US" dirty="0" smtClean="0"/>
+              <a:t>Many ways it can be done</a:t>
+            </a:r>
+          </a:p>
+          <a:p>
+            <a:r>
+              <a:rPr lang="en-US" dirty="0" smtClean="0"/>
+              <a:t>Good design principles</a:t>
+            </a:r>
+          </a:p>
+          <a:p>
+            <a:pPr lvl="1"/>
+            <a:r>
+              <a:rPr lang="en-US" dirty="0" smtClean="0"/>
+              <a:t>Make it </a:t>
+            </a:r>
+            <a:r>
+              <a:rPr lang="en-US" b="1" dirty="0" smtClean="0"/>
+              <a:t>easy to use and extend code</a:t>
+            </a:r>
+          </a:p>
+          <a:p>
+            <a:r>
+              <a:rPr lang="en-US" dirty="0" smtClean="0"/>
+              <a:t>Functional but bad design principles</a:t>
+            </a:r>
+          </a:p>
+          <a:p>
+            <a:pPr lvl="1"/>
+            <a:r>
+              <a:rPr lang="en-US" dirty="0" smtClean="0"/>
+              <a:t>Use “type predicated code”</a:t>
+            </a:r>
+          </a:p>
+          <a:p>
+            <a:pPr lvl="1"/>
+            <a:r>
+              <a:rPr lang="en-US" dirty="0" smtClean="0"/>
+              <a:t>… if ( “</a:t>
+            </a:r>
+            <a:r>
+              <a:rPr lang="en-US" dirty="0" err="1"/>
+              <a:t>i</a:t>
+            </a:r>
+            <a:r>
+              <a:rPr lang="en-US" dirty="0" err="1" smtClean="0"/>
+              <a:t>nstanceof</a:t>
+            </a:r>
+            <a:r>
+              <a:rPr lang="en-US" dirty="0" smtClean="0"/>
+              <a:t>, </a:t>
+            </a:r>
+            <a:r>
+              <a:rPr lang="en-US" dirty="0" err="1" smtClean="0"/>
+              <a:t>getClass</a:t>
+            </a:r>
+            <a:r>
+              <a:rPr lang="en-US" dirty="0" smtClean="0"/>
+              <a:t>(), </a:t>
+            </a:r>
+            <a:r>
+              <a:rPr lang="en-US" dirty="0" err="1" smtClean="0"/>
+              <a:t>getType</a:t>
+            </a:r>
+            <a:r>
+              <a:rPr lang="en-US" dirty="0" smtClean="0"/>
+              <a:t>()” ==/equals)</a:t>
+            </a:r>
+          </a:p>
+          <a:p>
+            <a:pPr lvl="1"/>
+            <a:r>
+              <a:rPr lang="en-US" dirty="0" smtClean="0"/>
+              <a:t>OUTLAWED in your project design!</a:t>
+            </a:r>
+          </a:p>
+          <a:p>
+            <a:pPr lvl="1"/>
+            <a:r>
+              <a:rPr lang="en-US" dirty="0" smtClean="0"/>
+              <a:t>Your design should not use these at all!</a:t>
+            </a:r>
+            <a:endParaRPr lang="en-US" dirty="0"/>
+          </a:p>
+        </p:txBody>
+      </p:sp>
+    </p:spTree>
+    <p:extLst>
+      <p:ext uri="{BB962C8B-B14F-4D97-AF65-F5344CB8AC3E}">
+        <p14:creationId xmlns:p14="http://schemas.microsoft.com/office/powerpoint/2010/main" val="1608855851"/>
+      </p:ext>
+    </p:extLst>
+  </p:cSld>
+  <p:clrMapOvr>
+    <a:masterClrMapping/>
+  </p:clrMapOvr>
+  <p:timing>
+    <p:tnLst>
+      <p:par>
+        <p:cTn id="1" dur="indefinite" restart="never" nodeType="tmRoot"/>
+      </p:par>
+    </p:tnLst>
+  </p:timing>
+</p:sld>
+</file>
+
+<file path=ppt/slides/slide5.xml><?xml version="1.0" encoding="utf-8"?>
+<p:sld xmlns:a="http://schemas.openxmlformats.org/drawingml/2006/main" xmlns:r="http://schemas.openxmlformats.org/officeDocument/2006/relationships" xmlns:p="http://schemas.openxmlformats.org/presentationml/2006/main">
+  <p:cSld>
+    <p:spTree>
+      <p:nvGrpSpPr>
+        <p:cNvPr id="1" name=""/>
+        <p:cNvGrpSpPr/>
+        <p:nvPr/>
+      </p:nvGrpSpPr>
+      <p:grpSpPr>
+        <a:xfrm>
+          <a:off x="0" y="0"/>
+          <a:ext cx="0" cy="0"/>
+          <a:chOff x="0" y="0"/>
+          <a:chExt cx="0" cy="0"/>
+        </a:xfrm>
+      </p:grpSpPr>
+      <p:sp>
+        <p:nvSpPr>
+          <p:cNvPr id="2" name="Title 1"/>
+          <p:cNvSpPr>
+            <a:spLocks noGrp="1"/>
+          </p:cNvSpPr>
+          <p:nvPr>
+            <p:ph type="title"/>
+          </p:nvPr>
+        </p:nvSpPr>
+        <p:spPr/>
+        <p:txBody>
+          <a:bodyPr/>
+          <a:lstStyle/>
+          <a:p>
+            <a:r>
+              <a:rPr lang="en-US" dirty="0" smtClean="0"/>
+              <a:t>Live Coding</a:t>
+            </a:r>
+            <a:endParaRPr lang="en-US" dirty="0"/>
+          </a:p>
+        </p:txBody>
+      </p:sp>
+      <p:sp>
+        <p:nvSpPr>
+          <p:cNvPr id="3" name="Content Placeholder 2"/>
+          <p:cNvSpPr>
+            <a:spLocks noGrp="1"/>
+          </p:cNvSpPr>
+          <p:nvPr>
+            <p:ph idx="1"/>
+          </p:nvPr>
+        </p:nvSpPr>
+        <p:spPr/>
+        <p:txBody>
+          <a:bodyPr/>
+          <a:lstStyle/>
+          <a:p>
+            <a:r>
+              <a:rPr lang="en-US" dirty="0" smtClean="0"/>
+              <a:t>Let’s consider a simulator with collisions</a:t>
+            </a:r>
+          </a:p>
+          <a:p>
+            <a:r>
+              <a:rPr lang="en-US" dirty="0" smtClean="0"/>
+              <a:t>More Raindrops More Platforms</a:t>
+            </a:r>
+          </a:p>
+          <a:p>
+            <a:r>
+              <a:rPr lang="en-US" dirty="0" smtClean="0"/>
+              <a:t>Run Main.java</a:t>
+            </a:r>
+          </a:p>
+          <a:p>
+            <a:endParaRPr lang="en-US" dirty="0"/>
+          </a:p>
+        </p:txBody>
+      </p:sp>
+    </p:spTree>
+    <p:extLst>
+      <p:ext uri="{BB962C8B-B14F-4D97-AF65-F5344CB8AC3E}">
+        <p14:creationId xmlns:p14="http://schemas.microsoft.com/office/powerpoint/2010/main" val="1736097128"/>
+      </p:ext>
+    </p:extLst>
+  </p:cSld>
+  <p:clrMapOvr>
+    <a:masterClrMapping/>
+  </p:clrMapOvr>
+  <p:timing>
+    <p:tnLst>
+      <p:par>
+        <p:cTn id="1" dur="indefinite" restart="never" nodeType="tmRoot"/>
+      </p:par>
+    </p:tnLst>
+  </p:timing>
+</p:sld>
+</file>
+
+<file path=ppt/slides/slide6.xml><?xml version="1.0" encoding="utf-8"?>
+<p:sld xmlns:a="http://schemas.openxmlformats.org/drawingml/2006/main" xmlns:r="http://schemas.openxmlformats.org/officeDocument/2006/relationships" xmlns:p="http://schemas.openxmlformats.org/presentationml/2006/main">
+  <p:cSld>
+    <p:spTree>
+      <p:nvGrpSpPr>
+        <p:cNvPr id="1" name=""/>
+        <p:cNvGrpSpPr/>
+        <p:nvPr/>
+      </p:nvGrpSpPr>
+      <p:grpSpPr>
+        <a:xfrm>
+          <a:off x="0" y="0"/>
+          <a:ext cx="0" cy="0"/>
+          <a:chOff x="0" y="0"/>
+          <a:chExt cx="0" cy="0"/>
+        </a:xfrm>
+      </p:grpSpPr>
+      <p:sp>
+        <p:nvSpPr>
+          <p:cNvPr id="2" name="Title 1"/>
+          <p:cNvSpPr>
+            <a:spLocks noGrp="1"/>
+          </p:cNvSpPr>
+          <p:nvPr>
+            <p:ph type="title"/>
+          </p:nvPr>
+        </p:nvSpPr>
+        <p:spPr/>
+        <p:txBody>
+          <a:bodyPr/>
+          <a:lstStyle/>
+          <a:p>
+            <a:r>
+              <a:rPr lang="en-US" dirty="0" smtClean="0"/>
+              <a:t>Extend Functionality</a:t>
+            </a:r>
+            <a:endParaRPr lang="en-US" dirty="0"/>
+          </a:p>
+        </p:txBody>
+      </p:sp>
+      <p:sp>
+        <p:nvSpPr>
+          <p:cNvPr id="3" name="Content Placeholder 2"/>
+          <p:cNvSpPr>
+            <a:spLocks noGrp="1"/>
+          </p:cNvSpPr>
+          <p:nvPr>
+            <p:ph idx="1"/>
+          </p:nvPr>
+        </p:nvSpPr>
+        <p:spPr/>
+        <p:txBody>
+          <a:bodyPr/>
+          <a:lstStyle/>
+          <a:p>
+            <a:r>
+              <a:rPr lang="en-US" dirty="0"/>
+              <a:t>Implement an </a:t>
+            </a:r>
+            <a:r>
+              <a:rPr lang="en-US" dirty="0" err="1"/>
+              <a:t>InvincibilityDrop</a:t>
+            </a:r>
+            <a:r>
+              <a:rPr lang="en-US" dirty="0"/>
+              <a:t> </a:t>
+            </a:r>
+          </a:p>
+          <a:p>
+            <a:pPr lvl="1"/>
+            <a:r>
+              <a:rPr lang="en-US" dirty="0" smtClean="0"/>
+              <a:t>makes </a:t>
+            </a:r>
+            <a:r>
+              <a:rPr lang="en-US" dirty="0"/>
+              <a:t>a </a:t>
+            </a:r>
+            <a:r>
+              <a:rPr lang="en-US" dirty="0" err="1"/>
+              <a:t>BouncingPlatform</a:t>
+            </a:r>
+            <a:r>
+              <a:rPr lang="en-US" dirty="0"/>
+              <a:t> </a:t>
+            </a:r>
+            <a:r>
+              <a:rPr lang="en-US" dirty="0" smtClean="0"/>
+              <a:t>invincible </a:t>
+            </a:r>
+            <a:r>
+              <a:rPr lang="en-US" dirty="0"/>
+              <a:t>for 50 </a:t>
+            </a:r>
+            <a:r>
+              <a:rPr lang="en-US" dirty="0" smtClean="0"/>
+              <a:t>ticks</a:t>
+            </a:r>
+            <a:r>
+              <a:rPr lang="en-US" u="sng" dirty="0" smtClean="0"/>
+              <a:t> </a:t>
+            </a:r>
+            <a:endParaRPr lang="en-US" dirty="0"/>
+          </a:p>
+          <a:p>
+            <a:pPr lvl="1"/>
+            <a:r>
+              <a:rPr lang="en-US" dirty="0" smtClean="0"/>
+              <a:t>drops should not affect platforms when invincible</a:t>
+            </a:r>
+            <a:endParaRPr lang="en-US" dirty="0"/>
+          </a:p>
+          <a:p>
+            <a:pPr lvl="1"/>
+            <a:r>
+              <a:rPr lang="en-US" dirty="0" smtClean="0"/>
+              <a:t>color </a:t>
+            </a:r>
+            <a:r>
+              <a:rPr lang="en-US" dirty="0"/>
+              <a:t>should be Yellow</a:t>
+            </a:r>
+          </a:p>
+          <a:p>
+            <a:pPr lvl="1"/>
+            <a:r>
+              <a:rPr lang="en-US" dirty="0" smtClean="0"/>
+              <a:t>size </a:t>
+            </a:r>
+            <a:r>
+              <a:rPr lang="en-US" dirty="0"/>
+              <a:t>should be </a:t>
+            </a:r>
+            <a:r>
+              <a:rPr lang="en-US" dirty="0" smtClean="0"/>
+              <a:t>20</a:t>
+            </a:r>
+          </a:p>
+          <a:p>
+            <a:pPr lvl="1"/>
+            <a:r>
+              <a:rPr lang="en-US" dirty="0" smtClean="0"/>
+              <a:t>absorbed by </a:t>
+            </a:r>
+            <a:r>
+              <a:rPr lang="en-US" dirty="0" err="1" smtClean="0"/>
+              <a:t>UserControlledPlatform</a:t>
+            </a:r>
+            <a:r>
+              <a:rPr lang="en-US" dirty="0" smtClean="0"/>
+              <a:t> like others</a:t>
+            </a:r>
+            <a:endParaRPr lang="en-US" dirty="0"/>
+          </a:p>
+        </p:txBody>
+      </p:sp>
+    </p:spTree>
+    <p:extLst>
+      <p:ext uri="{BB962C8B-B14F-4D97-AF65-F5344CB8AC3E}">
+        <p14:creationId xmlns:p14="http://schemas.microsoft.com/office/powerpoint/2010/main" val="3961337595"/>
+      </p:ext>
+    </p:extLst>
+  </p:cSld>
+  <p:clrMapOvr>
+    <a:masterClrMapping/>
+  </p:clrMapOvr>
+  <p:timing>
+    <p:tnLst>
+      <p:par>
+        <p:cTn id="1" dur="indefinite" restart="never" nodeType="tmRoot"/>
+      </p:par>
+    </p:tnLst>
+  </p:timing>
+</p:sld>
+</file>
+
+<file path=ppt/slides/slide7.xml><?xml version="1.0" encoding="utf-8"?>
+<p:sld xmlns:a="http://schemas.openxmlformats.org/drawingml/2006/main" xmlns:r="http://schemas.openxmlformats.org/officeDocument/2006/relationships" xmlns:p="http://schemas.openxmlformats.org/presentationml/2006/main">
+  <p:cSld>
+    <p:spTree>
+      <p:nvGrpSpPr>
+        <p:cNvPr id="1" name=""/>
+        <p:cNvGrpSpPr/>
+        <p:nvPr/>
+      </p:nvGrpSpPr>
+      <p:grpSpPr>
+        <a:xfrm>
+          <a:off x="0" y="0"/>
+          <a:ext cx="0" cy="0"/>
+          <a:chOff x="0" y="0"/>
+          <a:chExt cx="0" cy="0"/>
+        </a:xfrm>
+      </p:grpSpPr>
+      <p:sp>
+        <p:nvSpPr>
+          <p:cNvPr id="2" name="Title 1"/>
+          <p:cNvSpPr>
+            <a:spLocks noGrp="1"/>
+          </p:cNvSpPr>
+          <p:nvPr>
+            <p:ph type="title"/>
+          </p:nvPr>
+        </p:nvSpPr>
+        <p:spPr/>
+        <p:txBody>
+          <a:bodyPr/>
+          <a:lstStyle/>
+          <a:p>
+            <a:r>
+              <a:rPr lang="en-US" dirty="0" smtClean="0"/>
+              <a:t>GameComponent.java</a:t>
+            </a:r>
+            <a:endParaRPr lang="en-US" dirty="0"/>
+          </a:p>
+        </p:txBody>
+      </p:sp>
+      <p:sp>
+        <p:nvSpPr>
+          <p:cNvPr id="3" name="Content Placeholder 2"/>
+          <p:cNvSpPr>
+            <a:spLocks noGrp="1"/>
+          </p:cNvSpPr>
+          <p:nvPr>
+            <p:ph idx="1"/>
+          </p:nvPr>
+        </p:nvSpPr>
+        <p:spPr/>
+        <p:txBody>
+          <a:bodyPr/>
+          <a:lstStyle/>
+          <a:p>
+            <a:r>
+              <a:rPr lang="en-US" sz="2800" dirty="0" smtClean="0"/>
+              <a:t>Let’s look how collisions are handled</a:t>
+            </a:r>
+          </a:p>
+          <a:p>
+            <a:r>
+              <a:rPr lang="en-US" sz="2800" dirty="0" smtClean="0"/>
+              <a:t>Where would changes in code need to happen?</a:t>
+            </a:r>
+          </a:p>
+          <a:p>
+            <a:r>
+              <a:rPr lang="en-US" sz="2800" dirty="0" smtClean="0"/>
+              <a:t>Look for examples of “type predicated code”</a:t>
+            </a:r>
+          </a:p>
+          <a:p>
+            <a:pPr lvl="1"/>
+            <a:r>
+              <a:rPr lang="en-US" sz="2400" dirty="0" smtClean="0"/>
+              <a:t>Why is this hard to use/extend?</a:t>
+            </a:r>
+          </a:p>
+          <a:p>
+            <a:endParaRPr lang="en-US" sz="2800" dirty="0"/>
+          </a:p>
+        </p:txBody>
+      </p:sp>
+    </p:spTree>
+    <p:extLst>
+      <p:ext uri="{BB962C8B-B14F-4D97-AF65-F5344CB8AC3E}">
+        <p14:creationId xmlns:p14="http://schemas.microsoft.com/office/powerpoint/2010/main" val="4276672556"/>
+      </p:ext>
+    </p:extLst>
+  </p:cSld>
+  <p:clrMapOvr>
+    <a:masterClrMapping/>
+  </p:clrMapOvr>
+  <p:timing>
+    <p:tnLst>
+      <p:par>
+        <p:cTn id="1" dur="indefinite" restart="never" nodeType="tmRoot"/>
+      </p:par>
+    </p:tnLst>
+  </p:timing>
 </p:sld>
 </file>
 
@@ -8214,7 +8623,7 @@
           <p:nvPr>
             <p:extLst>
               <p:ext uri="{D42A27DB-BD31-4B8C-83A1-F6EECF244321}">
-                <p14:modId xmlns:p14="http://schemas.microsoft.com/office/powerpoint/2010/main" val="2253544032"/>
+                <p14:modId xmlns:p14="http://schemas.microsoft.com/office/powerpoint/2010/main" val="1486781072"/>
               </p:ext>
             </p:extLst>
           </p:nvPr>
@@ -8379,10 +8788,6 @@
                     <a:bodyPr/>
                     <a:lstStyle/>
                     <a:p>
-                      <a:r>
-                        <a:rPr lang="en-US" sz="2400" dirty="0" smtClean="0"/>
-                        <a:t>X</a:t>
-                      </a:r>
                       <a:endParaRPr lang="en-US" sz="2400" dirty="0"/>
                     </a:p>
                   </a:txBody>
@@ -8393,11 +8798,7 @@
                     <a:bodyPr/>
                     <a:lstStyle/>
                     <a:p>
-                      <a:r>
-                        <a:rPr lang="en-US" sz="2400" dirty="0" smtClean="0"/>
-                        <a:t>X</a:t>
-                      </a:r>
-                      <a:endParaRPr lang="en-US" sz="2400" dirty="0"/>
+                      <a:endParaRPr lang="en-US" sz="2400"/>
                     </a:p>
                   </a:txBody>
                   <a:tcPr marL="129683" marR="129683" marT="64842" marB="64842"/>
@@ -8448,10 +8849,6 @@
                     <a:bodyPr/>
                     <a:lstStyle/>
                     <a:p>
-                      <a:r>
-                        <a:rPr lang="en-US" sz="2400" dirty="0" smtClean="0"/>
-                        <a:t>X</a:t>
-                      </a:r>
                       <a:endParaRPr lang="en-US" sz="2400" dirty="0"/>
                     </a:p>
                   </a:txBody>
@@ -8462,11 +8859,7 @@
                     <a:bodyPr/>
                     <a:lstStyle/>
                     <a:p>
-                      <a:r>
-                        <a:rPr lang="en-US" sz="2400" dirty="0" smtClean="0"/>
-                        <a:t>X</a:t>
-                      </a:r>
-                      <a:endParaRPr lang="en-US" sz="2400" dirty="0"/>
+                      <a:endParaRPr lang="en-US" sz="2400"/>
                     </a:p>
                   </a:txBody>
                   <a:tcPr marL="129683" marR="129683" marT="64842" marB="64842"/>
@@ -8497,25 +8890,17 @@
                     <a:bodyPr/>
                     <a:lstStyle/>
                     <a:p>
-                      <a:r>
-                        <a:rPr lang="en-US" sz="2400" dirty="0" smtClean="0"/>
-                        <a:t>X</a:t>
-                      </a:r>
-                      <a:endParaRPr lang="en-US" sz="2400" dirty="0"/>
-                    </a:p>
-                  </a:txBody>
-                  <a:tcPr marL="129683" marR="129683" marT="64842" marB="64842"/>
-                </a:tc>
-                <a:tc>
-                  <a:txBody>
-                    <a:bodyPr/>
-                    <a:lstStyle/>
-                    <a:p>
-                      <a:r>
-                        <a:rPr lang="en-US" sz="2400" dirty="0" smtClean="0"/>
-                        <a:t>X</a:t>
-                      </a:r>
-                      <a:endParaRPr lang="en-US" sz="2400" dirty="0"/>
+                      <a:endParaRPr lang="en-US" sz="2400"/>
+                    </a:p>
+                  </a:txBody>
+                  <a:tcPr marL="129683" marR="129683" marT="64842" marB="64842"/>
+                </a:tc>
+                <a:tc>
+                  <a:txBody>
+                    <a:bodyPr/>
+                    <a:lstStyle/>
+                    <a:p>
+                      <a:endParaRPr lang="en-US" sz="2400"/>
                     </a:p>
                   </a:txBody>
                   <a:tcPr marL="129683" marR="129683" marT="64842" marB="64842"/>
@@ -8566,25 +8951,17 @@
                     <a:bodyPr/>
                     <a:lstStyle/>
                     <a:p>
-                      <a:r>
-                        <a:rPr lang="en-US" sz="2400" dirty="0" smtClean="0"/>
-                        <a:t>X</a:t>
-                      </a:r>
-                      <a:endParaRPr lang="en-US" sz="2400" dirty="0"/>
-                    </a:p>
-                  </a:txBody>
-                  <a:tcPr marL="129683" marR="129683" marT="64842" marB="64842"/>
-                </a:tc>
-                <a:tc>
-                  <a:txBody>
-                    <a:bodyPr/>
-                    <a:lstStyle/>
-                    <a:p>
-                      <a:r>
-                        <a:rPr lang="en-US" sz="2400" dirty="0" smtClean="0"/>
-                        <a:t>X</a:t>
-                      </a:r>
-                      <a:endParaRPr lang="en-US" sz="2400" dirty="0"/>
+                      <a:endParaRPr lang="en-US" sz="2400"/>
+                    </a:p>
+                  </a:txBody>
+                  <a:tcPr marL="129683" marR="129683" marT="64842" marB="64842"/>
+                </a:tc>
+                <a:tc>
+                  <a:txBody>
+                    <a:bodyPr/>
+                    <a:lstStyle/>
+                    <a:p>
+                      <a:endParaRPr lang="en-US" sz="2400"/>
                     </a:p>
                   </a:txBody>
                   <a:tcPr marL="129683" marR="129683" marT="64842" marB="64842"/>
@@ -8652,13 +9029,20 @@
     </p:spTree>
     <p:extLst>
       <p:ext uri="{BB962C8B-B14F-4D97-AF65-F5344CB8AC3E}">
-        <p14:creationId xmlns:p14="http://schemas.microsoft.com/office/powerpoint/2010/main" val="1359110176"/>
+        <p14:creationId xmlns:p14="http://schemas.microsoft.com/office/powerpoint/2010/main" val="1718063911"/>
       </p:ext>
     </p:extLst>
   </p:cSld>
   <p:clrMapOvr>
     <a:masterClrMapping/>
   </p:clrMapOvr>
+  <p:timing>
+    <p:tnLst>
+      <p:par>
+        <p:cTn id="1" dur="indefinite" restart="never" nodeType="tmRoot"/>
+      </p:par>
+    </p:tnLst>
+  </p:timing>
 </p:sld>
 </file>
 
@@ -8711,7 +9095,7 @@
           <p:nvPr>
             <p:extLst>
               <p:ext uri="{D42A27DB-BD31-4B8C-83A1-F6EECF244321}">
-                <p14:modId xmlns:p14="http://schemas.microsoft.com/office/powerpoint/2010/main" val="1625645834"/>
+                <p14:modId xmlns:p14="http://schemas.microsoft.com/office/powerpoint/2010/main" val="2253544032"/>
               </p:ext>
             </p:extLst>
           </p:nvPr>
@@ -9124,8 +9508,8 @@
         </p:nvSpPr>
         <p:spPr>
           <a:xfrm>
-            <a:off x="347194" y="1417638"/>
-            <a:ext cx="8449612" cy="1569660"/>
+            <a:off x="359226" y="2438400"/>
+            <a:ext cx="8449612" cy="584775"/>
           </a:xfrm>
           <a:prstGeom prst="rect">
             <a:avLst/>
@@ -9139,31 +9523,30 @@
           <a:lstStyle/>
           <a:p>
             <a:r>
-              <a:rPr lang="en-US" sz="2400" dirty="0" smtClean="0"/>
-              <a:t>When we have multiple objects which interact with the same object, we can use </a:t>
-            </a:r>
-            <a:r>
-              <a:rPr lang="en-US" sz="2400" b="1" i="1" dirty="0" smtClean="0"/>
-              <a:t>inheritance</a:t>
-            </a:r>
-            <a:r>
-              <a:rPr lang="en-US" sz="2400" dirty="0" smtClean="0"/>
-              <a:t> to help us make a design to deal with the collisions. We should have the classes which differ provide the functionality to deal with the collisions.</a:t>
-            </a:r>
-            <a:endParaRPr lang="en-US" sz="2400" dirty="0"/>
+              <a:rPr lang="en-US" sz="3200" dirty="0" smtClean="0"/>
+              <a:t>When do collisions happen?</a:t>
+            </a:r>
+            <a:endParaRPr lang="en-US" sz="3200" dirty="0"/>
           </a:p>
         </p:txBody>
       </p:sp>
     </p:spTree>
     <p:extLst>
       <p:ext uri="{BB962C8B-B14F-4D97-AF65-F5344CB8AC3E}">
-        <p14:creationId xmlns:p14="http://schemas.microsoft.com/office/powerpoint/2010/main" val="680180803"/>
+        <p14:creationId xmlns:p14="http://schemas.microsoft.com/office/powerpoint/2010/main" val="1359110176"/>
       </p:ext>
     </p:extLst>
   </p:cSld>
   <p:clrMapOvr>
     <a:masterClrMapping/>
   </p:clrMapOvr>
+  <p:timing>
+    <p:tnLst>
+      <p:par>
+        <p:cTn id="1" dur="indefinite" restart="never" nodeType="tmRoot"/>
+      </p:par>
+    </p:tnLst>
+  </p:timing>
 </p:sld>
 </file>
 

</xml_diff>